<commit_message>
add details to ppt
</commit_message>
<xml_diff>
--- a/Etendre VS Code - Devoxx 2019.pptx
+++ b/Etendre VS Code - Devoxx 2019.pptx
@@ -5,14 +5,15 @@
     <p:sldMasterId id="2147483648" r:id="rId1"/>
   </p:sldMasterIdLst>
   <p:notesMasterIdLst>
-    <p:notesMasterId r:id="rId7"/>
+    <p:notesMasterId r:id="rId8"/>
   </p:notesMasterIdLst>
   <p:sldIdLst>
     <p:sldId id="256" r:id="rId2"/>
     <p:sldId id="270" r:id="rId3"/>
     <p:sldId id="271" r:id="rId4"/>
     <p:sldId id="268" r:id="rId5"/>
-    <p:sldId id="269" r:id="rId6"/>
+    <p:sldId id="272" r:id="rId6"/>
+    <p:sldId id="269" r:id="rId7"/>
   </p:sldIdLst>
   <p:sldSz cx="24384000" cy="13716000"/>
   <p:notesSz cx="6858000" cy="9144000"/>
@@ -764,7 +765,7 @@
           </a:ln>
           <a:extLst>
             <a:ext uri="{C572A759-6A51-4108-AA02-DFA0A04FC94B}">
-              <ma14:wrappingTextBoxFlag xmlns="" xmlns:m="http://schemas.openxmlformats.org/officeDocument/2006/math" xmlns:a14="http://schemas.microsoft.com/office/drawing/2010/main" xmlns:ma14="http://schemas.microsoft.com/office/mac/drawingml/2011/main" val="1"/>
+              <ma14:wrappingTextBoxFlag xmlns:ma14="http://schemas.microsoft.com/office/mac/drawingml/2011/main" xmlns:a14="http://schemas.microsoft.com/office/drawing/2010/main" xmlns:m="http://schemas.openxmlformats.org/officeDocument/2006/math" xmlns="" val="1"/>
             </a:ext>
           </a:extLst>
         </p:spPr>
@@ -991,7 +992,7 @@
           </a:ln>
           <a:extLst>
             <a:ext uri="{C572A759-6A51-4108-AA02-DFA0A04FC94B}">
-              <ma14:wrappingTextBoxFlag xmlns="" xmlns:m="http://schemas.openxmlformats.org/officeDocument/2006/math" xmlns:a14="http://schemas.microsoft.com/office/drawing/2010/main" xmlns:ma14="http://schemas.microsoft.com/office/mac/drawingml/2011/main" val="1"/>
+              <ma14:wrappingTextBoxFlag xmlns:ma14="http://schemas.microsoft.com/office/mac/drawingml/2011/main" xmlns:a14="http://schemas.microsoft.com/office/drawing/2010/main" xmlns:m="http://schemas.openxmlformats.org/officeDocument/2006/math" xmlns="" val="1"/>
             </a:ext>
           </a:extLst>
         </p:spPr>
@@ -1212,7 +1213,7 @@
           </a:ln>
           <a:extLst>
             <a:ext uri="{C572A759-6A51-4108-AA02-DFA0A04FC94B}">
-              <ma14:wrappingTextBoxFlag xmlns="" xmlns:m="http://schemas.openxmlformats.org/officeDocument/2006/math" xmlns:a14="http://schemas.microsoft.com/office/drawing/2010/main" xmlns:ma14="http://schemas.microsoft.com/office/mac/drawingml/2011/main" val="1"/>
+              <ma14:wrappingTextBoxFlag xmlns:ma14="http://schemas.microsoft.com/office/mac/drawingml/2011/main" xmlns:a14="http://schemas.microsoft.com/office/drawing/2010/main" xmlns:m="http://schemas.openxmlformats.org/officeDocument/2006/math" xmlns="" val="1"/>
             </a:ext>
           </a:extLst>
         </p:spPr>
@@ -1582,7 +1583,7 @@
           </a:ln>
           <a:extLst>
             <a:ext uri="{C572A759-6A51-4108-AA02-DFA0A04FC94B}">
-              <ma14:wrappingTextBoxFlag xmlns="" xmlns:m="http://schemas.openxmlformats.org/officeDocument/2006/math" xmlns:a14="http://schemas.microsoft.com/office/drawing/2010/main" xmlns:ma14="http://schemas.microsoft.com/office/mac/drawingml/2011/main" val="1"/>
+              <ma14:wrappingTextBoxFlag xmlns:ma14="http://schemas.microsoft.com/office/mac/drawingml/2011/main" xmlns:a14="http://schemas.microsoft.com/office/drawing/2010/main" xmlns:m="http://schemas.openxmlformats.org/officeDocument/2006/math" xmlns="" val="1"/>
             </a:ext>
           </a:extLst>
         </p:spPr>
@@ -1809,7 +1810,7 @@
           </a:ln>
           <a:extLst>
             <a:ext uri="{C572A759-6A51-4108-AA02-DFA0A04FC94B}">
-              <ma14:wrappingTextBoxFlag xmlns="" xmlns:m="http://schemas.openxmlformats.org/officeDocument/2006/math" xmlns:a14="http://schemas.microsoft.com/office/drawing/2010/main" xmlns:ma14="http://schemas.microsoft.com/office/mac/drawingml/2011/main" val="1"/>
+              <ma14:wrappingTextBoxFlag xmlns:ma14="http://schemas.microsoft.com/office/mac/drawingml/2011/main" xmlns:a14="http://schemas.microsoft.com/office/drawing/2010/main" xmlns:m="http://schemas.openxmlformats.org/officeDocument/2006/math" xmlns="" val="1"/>
             </a:ext>
           </a:extLst>
         </p:spPr>
@@ -2018,7 +2019,7 @@
           </a:ln>
           <a:extLst>
             <a:ext uri="{C572A759-6A51-4108-AA02-DFA0A04FC94B}">
-              <ma14:wrappingTextBoxFlag xmlns="" xmlns:m="http://schemas.openxmlformats.org/officeDocument/2006/math" xmlns:a14="http://schemas.microsoft.com/office/drawing/2010/main" xmlns:ma14="http://schemas.microsoft.com/office/mac/drawingml/2011/main" val="1"/>
+              <ma14:wrappingTextBoxFlag xmlns:ma14="http://schemas.microsoft.com/office/mac/drawingml/2011/main" xmlns:a14="http://schemas.microsoft.com/office/drawing/2010/main" xmlns:m="http://schemas.openxmlformats.org/officeDocument/2006/math" xmlns="" val="1"/>
             </a:ext>
           </a:extLst>
         </p:spPr>
@@ -2236,7 +2237,7 @@
           </a:ln>
           <a:extLst>
             <a:ext uri="{C572A759-6A51-4108-AA02-DFA0A04FC94B}">
-              <ma14:wrappingTextBoxFlag xmlns="" xmlns:m="http://schemas.openxmlformats.org/officeDocument/2006/math" xmlns:a14="http://schemas.microsoft.com/office/drawing/2010/main" xmlns:ma14="http://schemas.microsoft.com/office/mac/drawingml/2011/main" val="1"/>
+              <ma14:wrappingTextBoxFlag xmlns:ma14="http://schemas.microsoft.com/office/mac/drawingml/2011/main" xmlns:a14="http://schemas.microsoft.com/office/drawing/2010/main" xmlns:m="http://schemas.openxmlformats.org/officeDocument/2006/math" xmlns="" val="1"/>
             </a:ext>
           </a:extLst>
         </p:spPr>
@@ -2476,7 +2477,7 @@
           </a:ln>
           <a:extLst>
             <a:ext uri="{C572A759-6A51-4108-AA02-DFA0A04FC94B}">
-              <ma14:wrappingTextBoxFlag xmlns="" xmlns:m="http://schemas.openxmlformats.org/officeDocument/2006/math" xmlns:a14="http://schemas.microsoft.com/office/drawing/2010/main" xmlns:ma14="http://schemas.microsoft.com/office/mac/drawingml/2011/main" val="1"/>
+              <ma14:wrappingTextBoxFlag xmlns:ma14="http://schemas.microsoft.com/office/mac/drawingml/2011/main" xmlns:a14="http://schemas.microsoft.com/office/drawing/2010/main" xmlns:m="http://schemas.openxmlformats.org/officeDocument/2006/math" xmlns="" val="1"/>
             </a:ext>
           </a:extLst>
         </p:spPr>
@@ -2656,7 +2657,7 @@
           </a:ln>
           <a:extLst>
             <a:ext uri="{C572A759-6A51-4108-AA02-DFA0A04FC94B}">
-              <ma14:wrappingTextBoxFlag xmlns="" xmlns:m="http://schemas.openxmlformats.org/officeDocument/2006/math" xmlns:a14="http://schemas.microsoft.com/office/drawing/2010/main" xmlns:ma14="http://schemas.microsoft.com/office/mac/drawingml/2011/main" val="1"/>
+              <ma14:wrappingTextBoxFlag xmlns:ma14="http://schemas.microsoft.com/office/mac/drawingml/2011/main" xmlns:a14="http://schemas.microsoft.com/office/drawing/2010/main" xmlns:m="http://schemas.openxmlformats.org/officeDocument/2006/math" xmlns="" val="1"/>
             </a:ext>
           </a:extLst>
         </p:spPr>
@@ -2768,7 +2769,7 @@
           </a:ln>
           <a:extLst>
             <a:ext uri="{C572A759-6A51-4108-AA02-DFA0A04FC94B}">
-              <ma14:wrappingTextBoxFlag xmlns="" xmlns:m="http://schemas.openxmlformats.org/officeDocument/2006/math" xmlns:a14="http://schemas.microsoft.com/office/drawing/2010/main" xmlns:ma14="http://schemas.microsoft.com/office/mac/drawingml/2011/main" val="1"/>
+              <ma14:wrappingTextBoxFlag xmlns:ma14="http://schemas.microsoft.com/office/mac/drawingml/2011/main" xmlns:a14="http://schemas.microsoft.com/office/drawing/2010/main" xmlns:m="http://schemas.openxmlformats.org/officeDocument/2006/math" xmlns="" val="1"/>
             </a:ext>
           </a:extLst>
         </p:spPr>
@@ -2911,7 +2912,7 @@
           </a:ln>
           <a:extLst>
             <a:ext uri="{C572A759-6A51-4108-AA02-DFA0A04FC94B}">
-              <ma14:wrappingTextBoxFlag xmlns="" xmlns:m="http://schemas.openxmlformats.org/officeDocument/2006/math" xmlns:a14="http://schemas.microsoft.com/office/drawing/2010/main" xmlns:ma14="http://schemas.microsoft.com/office/mac/drawingml/2011/main" val="1"/>
+              <ma14:wrappingTextBoxFlag xmlns:ma14="http://schemas.microsoft.com/office/mac/drawingml/2011/main" xmlns:a14="http://schemas.microsoft.com/office/drawing/2010/main" xmlns:m="http://schemas.openxmlformats.org/officeDocument/2006/math" xmlns="" val="1"/>
             </a:ext>
           </a:extLst>
         </p:spPr>
@@ -2959,7 +2960,7 @@
           </a:ln>
           <a:extLst>
             <a:ext uri="{C572A759-6A51-4108-AA02-DFA0A04FC94B}">
-              <ma14:wrappingTextBoxFlag xmlns="" xmlns:m="http://schemas.openxmlformats.org/officeDocument/2006/math" xmlns:a14="http://schemas.microsoft.com/office/drawing/2010/main" xmlns:ma14="http://schemas.microsoft.com/office/mac/drawingml/2011/main" val="1"/>
+              <ma14:wrappingTextBoxFlag xmlns:ma14="http://schemas.microsoft.com/office/mac/drawingml/2011/main" xmlns:a14="http://schemas.microsoft.com/office/drawing/2010/main" xmlns:m="http://schemas.openxmlformats.org/officeDocument/2006/math" xmlns="" val="1"/>
             </a:ext>
           </a:extLst>
         </p:spPr>
@@ -3977,11 +3978,7 @@
             <a:pPr algn="ctr"/>
             <a:r>
               <a:rPr lang="fr-FR" dirty="0" smtClean="0"/>
-              <a:t>Joan </a:t>
-            </a:r>
-            <a:r>
-              <a:rPr lang="fr-FR" dirty="0" smtClean="0"/>
-              <a:t>Rieu</a:t>
+              <a:t>Joan Rieu</a:t>
             </a:r>
             <a:br>
               <a:rPr lang="fr-FR" dirty="0" smtClean="0"/>
@@ -5038,6 +5035,96 @@
           </a:prstGeom>
         </p:spPr>
       </p:pic>
+      <p:sp>
+        <p:nvSpPr>
+          <p:cNvPr id="15" name="ZoneTexte 14"/>
+          <p:cNvSpPr txBox="1"/>
+          <p:nvPr/>
+        </p:nvSpPr>
+        <p:spPr>
+          <a:xfrm>
+            <a:off x="19436597" y="8157489"/>
+            <a:ext cx="1141338" cy="913711"/>
+          </a:xfrm>
+          <a:prstGeom prst="rect">
+            <a:avLst/>
+          </a:prstGeom>
+          <a:noFill/>
+          <a:ln w="12700" cap="flat">
+            <a:noFill/>
+            <a:miter lim="400000"/>
+          </a:ln>
+          <a:effectLst/>
+          <a:sp3d/>
+        </p:spPr>
+        <p:style>
+          <a:lnRef idx="0">
+            <a:scrgbClr r="0" g="0" b="0"/>
+          </a:lnRef>
+          <a:fillRef idx="0">
+            <a:scrgbClr r="0" g="0" b="0"/>
+          </a:fillRef>
+          <a:effectRef idx="0">
+            <a:scrgbClr r="0" g="0" b="0"/>
+          </a:effectRef>
+          <a:fontRef idx="none"/>
+        </p:style>
+        <p:txBody>
+          <a:bodyPr rot="0" spcFirstLastPara="1" vertOverflow="overflow" horzOverflow="overflow" vert="horz" wrap="none" lIns="71437" tIns="71437" rIns="71437" bIns="71437" numCol="1" spcCol="38100" rtlCol="0" anchor="ctr">
+            <a:spAutoFit/>
+          </a:bodyPr>
+          <a:lstStyle/>
+          <a:p>
+            <a:pPr marL="0" marR="0" indent="0" algn="ctr" defTabSz="821531" rtl="0" fontAlgn="auto" latinLnBrk="0" hangingPunct="0">
+              <a:lnSpc>
+                <a:spcPct val="100000"/>
+              </a:lnSpc>
+              <a:spcBef>
+                <a:spcPts val="0"/>
+              </a:spcBef>
+              <a:spcAft>
+                <a:spcPts val="0"/>
+              </a:spcAft>
+              <a:buClrTx/>
+              <a:buSzTx/>
+              <a:buFontTx/>
+              <a:buNone/>
+              <a:tabLst/>
+            </a:pPr>
+            <a:r>
+              <a:rPr kumimoji="0" lang="fr-FR" sz="5000" b="0" i="0" u="none" strike="noStrike" cap="none" spc="0" normalizeH="0" baseline="0" dirty="0" smtClean="0">
+                <a:ln>
+                  <a:noFill/>
+                </a:ln>
+                <a:solidFill>
+                  <a:srgbClr val="FFFFFF"/>
+                </a:solidFill>
+                <a:effectLst/>
+                <a:uFillTx/>
+                <a:latin typeface="Helvetica Light"/>
+                <a:ea typeface="Helvetica Light"/>
+                <a:cs typeface="Helvetica Light"/>
+                <a:sym typeface="Helvetica Light"/>
+              </a:rPr>
+              <a:t>CLI</a:t>
+            </a:r>
+            <a:endParaRPr kumimoji="0" lang="fr-FR" sz="5000" b="0" i="0" u="none" strike="noStrike" cap="none" spc="0" normalizeH="0" baseline="0" dirty="0">
+              <a:ln>
+                <a:noFill/>
+              </a:ln>
+              <a:solidFill>
+                <a:srgbClr val="FFFFFF"/>
+              </a:solidFill>
+              <a:effectLst/>
+              <a:uFillTx/>
+              <a:latin typeface="Helvetica Light"/>
+              <a:ea typeface="Helvetica Light"/>
+              <a:cs typeface="Helvetica Light"/>
+              <a:sym typeface="Helvetica Light"/>
+            </a:endParaRPr>
+          </a:p>
+        </p:txBody>
+      </p:sp>
     </p:spTree>
     <p:extLst>
       <p:ext uri="{BB962C8B-B14F-4D97-AF65-F5344CB8AC3E}">
@@ -5106,8 +5193,13 @@
             </a:pPr>
             <a:r>
               <a:rPr lang="fr-FR" dirty="0" smtClean="0"/>
-              <a:t>Interaction avec outils de développement</a:t>
-            </a:r>
+              <a:t>Interaction avec outils de </a:t>
+            </a:r>
+            <a:r>
+              <a:rPr lang="fr-FR" dirty="0" smtClean="0"/>
+              <a:t>développement</a:t>
+            </a:r>
+            <a:endParaRPr lang="fr-FR" dirty="0" smtClean="0"/>
           </a:p>
           <a:p>
             <a:pPr marL="685800" lvl="2" indent="-685800">
@@ -5136,8 +5228,8 @@
         </p:nvSpPr>
         <p:spPr>
           <a:xfrm>
-            <a:off x="9667875" y="0"/>
-            <a:ext cx="14716125" cy="2579688"/>
+            <a:off x="1" y="0"/>
+            <a:ext cx="24384000" cy="2579688"/>
           </a:xfrm>
         </p:spPr>
         <p:txBody>
@@ -5182,6 +5274,1291 @@
           </a:prstGeom>
         </p:spPr>
       </p:pic>
+      <p:sp>
+        <p:nvSpPr>
+          <p:cNvPr id="5" name="Arc 4"/>
+          <p:cNvSpPr/>
+          <p:nvPr/>
+        </p:nvSpPr>
+        <p:spPr>
+          <a:xfrm rot="19132034">
+            <a:off x="12119347" y="4245413"/>
+            <a:ext cx="6087909" cy="2727629"/>
+          </a:xfrm>
+          <a:prstGeom prst="arc">
+            <a:avLst>
+              <a:gd name="adj1" fmla="val 16200000"/>
+              <a:gd name="adj2" fmla="val 20856006"/>
+            </a:avLst>
+          </a:prstGeom>
+          <a:noFill/>
+          <a:ln w="38100" cap="flat">
+            <a:solidFill>
+              <a:srgbClr val="FFFFFF"/>
+            </a:solidFill>
+            <a:prstDash val="solid"/>
+            <a:miter lim="400000"/>
+          </a:ln>
+          <a:effectLst/>
+          <a:sp3d/>
+        </p:spPr>
+        <p:style>
+          <a:lnRef idx="0">
+            <a:scrgbClr r="0" g="0" b="0"/>
+          </a:lnRef>
+          <a:fillRef idx="0">
+            <a:scrgbClr r="0" g="0" b="0"/>
+          </a:fillRef>
+          <a:effectRef idx="0">
+            <a:scrgbClr r="0" g="0" b="0"/>
+          </a:effectRef>
+          <a:fontRef idx="none"/>
+        </p:style>
+        <p:txBody>
+          <a:bodyPr rot="0" spcFirstLastPara="1" vertOverflow="overflow" horzOverflow="overflow" vert="horz" wrap="square" lIns="91439" tIns="45719" rIns="91439" bIns="45719" numCol="1" spcCol="38100" rtlCol="0" anchor="t">
+            <a:noAutofit/>
+          </a:bodyPr>
+          <a:lstStyle/>
+          <a:p>
+            <a:pPr marL="0" marR="0" indent="0" algn="l" defTabSz="914400" rtl="0" fontAlgn="auto" latinLnBrk="1" hangingPunct="0">
+              <a:lnSpc>
+                <a:spcPct val="100000"/>
+              </a:lnSpc>
+              <a:spcBef>
+                <a:spcPts val="0"/>
+              </a:spcBef>
+              <a:spcAft>
+                <a:spcPts val="0"/>
+              </a:spcAft>
+              <a:buClrTx/>
+              <a:buSzTx/>
+              <a:buFontTx/>
+              <a:buNone/>
+              <a:tabLst/>
+            </a:pPr>
+            <a:endParaRPr kumimoji="0" lang="fr-FR" sz="1800" b="0" i="0" u="none" strike="noStrike" cap="none" spc="0" normalizeH="0" baseline="0">
+              <a:ln>
+                <a:noFill/>
+              </a:ln>
+              <a:solidFill>
+                <a:srgbClr val="000000"/>
+              </a:solidFill>
+              <a:effectLst/>
+              <a:uFillTx/>
+            </a:endParaRPr>
+          </a:p>
+        </p:txBody>
+      </p:sp>
+      <p:sp>
+        <p:nvSpPr>
+          <p:cNvPr id="6" name="ZoneTexte 5"/>
+          <p:cNvSpPr txBox="1"/>
+          <p:nvPr/>
+        </p:nvSpPr>
+        <p:spPr>
+          <a:xfrm>
+            <a:off x="17245918" y="2793810"/>
+            <a:ext cx="1731242" cy="913711"/>
+          </a:xfrm>
+          <a:prstGeom prst="rect">
+            <a:avLst/>
+          </a:prstGeom>
+          <a:noFill/>
+          <a:ln w="12700" cap="flat">
+            <a:noFill/>
+            <a:miter lim="400000"/>
+          </a:ln>
+          <a:effectLst/>
+          <a:sp3d/>
+        </p:spPr>
+        <p:style>
+          <a:lnRef idx="0">
+            <a:scrgbClr r="0" g="0" b="0"/>
+          </a:lnRef>
+          <a:fillRef idx="0">
+            <a:scrgbClr r="0" g="0" b="0"/>
+          </a:fillRef>
+          <a:effectRef idx="0">
+            <a:scrgbClr r="0" g="0" b="0"/>
+          </a:effectRef>
+          <a:fontRef idx="none"/>
+        </p:style>
+        <p:txBody>
+          <a:bodyPr rot="0" spcFirstLastPara="1" vertOverflow="overflow" horzOverflow="overflow" vert="horz" wrap="none" lIns="71437" tIns="71437" rIns="71437" bIns="71437" numCol="1" spcCol="38100" rtlCol="0" anchor="ctr">
+            <a:spAutoFit/>
+          </a:bodyPr>
+          <a:lstStyle/>
+          <a:p>
+            <a:pPr marL="0" marR="0" indent="0" algn="ctr" defTabSz="821531" rtl="0" fontAlgn="auto" latinLnBrk="0" hangingPunct="0">
+              <a:lnSpc>
+                <a:spcPct val="100000"/>
+              </a:lnSpc>
+              <a:spcBef>
+                <a:spcPts val="0"/>
+              </a:spcBef>
+              <a:spcAft>
+                <a:spcPts val="0"/>
+              </a:spcAft>
+              <a:buClrTx/>
+              <a:buSzTx/>
+              <a:buFontTx/>
+              <a:buNone/>
+              <a:tabLst/>
+            </a:pPr>
+            <a:r>
+              <a:rPr kumimoji="0" lang="fr-FR" sz="5000" b="0" i="0" u="none" strike="noStrike" cap="none" spc="0" normalizeH="0" baseline="0" dirty="0" smtClean="0">
+                <a:ln>
+                  <a:noFill/>
+                </a:ln>
+                <a:solidFill>
+                  <a:srgbClr val="FFFFFF"/>
+                </a:solidFill>
+                <a:effectLst/>
+                <a:uFillTx/>
+                <a:latin typeface="Ink Free" panose="03080402000500000000" pitchFamily="66" charset="0"/>
+                <a:sym typeface="Helvetica Light"/>
+              </a:rPr>
+              <a:t>CRUD</a:t>
+            </a:r>
+            <a:endParaRPr kumimoji="0" lang="fr-FR" sz="5000" b="0" i="0" u="none" strike="noStrike" cap="none" spc="0" normalizeH="0" baseline="0" dirty="0">
+              <a:ln>
+                <a:noFill/>
+              </a:ln>
+              <a:solidFill>
+                <a:srgbClr val="FFFFFF"/>
+              </a:solidFill>
+              <a:effectLst/>
+              <a:uFillTx/>
+              <a:latin typeface="Ink Free" panose="03080402000500000000" pitchFamily="66" charset="0"/>
+              <a:sym typeface="Helvetica Light"/>
+            </a:endParaRPr>
+          </a:p>
+        </p:txBody>
+      </p:sp>
+      <p:sp>
+        <p:nvSpPr>
+          <p:cNvPr id="11" name="Arc 10"/>
+          <p:cNvSpPr/>
+          <p:nvPr/>
+        </p:nvSpPr>
+        <p:spPr>
+          <a:xfrm rot="18789194">
+            <a:off x="15154074" y="6507838"/>
+            <a:ext cx="6077663" cy="2889849"/>
+          </a:xfrm>
+          <a:prstGeom prst="arc">
+            <a:avLst>
+              <a:gd name="adj1" fmla="val 16200000"/>
+              <a:gd name="adj2" fmla="val 20451464"/>
+            </a:avLst>
+          </a:prstGeom>
+          <a:noFill/>
+          <a:ln w="38100" cap="flat">
+            <a:solidFill>
+              <a:srgbClr val="FFFFFF"/>
+            </a:solidFill>
+            <a:prstDash val="solid"/>
+            <a:miter lim="400000"/>
+          </a:ln>
+          <a:effectLst/>
+          <a:sp3d/>
+        </p:spPr>
+        <p:style>
+          <a:lnRef idx="0">
+            <a:scrgbClr r="0" g="0" b="0"/>
+          </a:lnRef>
+          <a:fillRef idx="0">
+            <a:scrgbClr r="0" g="0" b="0"/>
+          </a:fillRef>
+          <a:effectRef idx="0">
+            <a:scrgbClr r="0" g="0" b="0"/>
+          </a:effectRef>
+          <a:fontRef idx="none"/>
+        </p:style>
+        <p:txBody>
+          <a:bodyPr rot="0" spcFirstLastPara="1" vertOverflow="overflow" horzOverflow="overflow" vert="horz" wrap="square" lIns="91439" tIns="45719" rIns="91439" bIns="45719" numCol="1" spcCol="38100" rtlCol="0" anchor="t">
+            <a:noAutofit/>
+          </a:bodyPr>
+          <a:lstStyle/>
+          <a:p>
+            <a:pPr marL="0" marR="0" indent="0" algn="l" defTabSz="914400" rtl="0" fontAlgn="auto" latinLnBrk="1" hangingPunct="0">
+              <a:lnSpc>
+                <a:spcPct val="100000"/>
+              </a:lnSpc>
+              <a:spcBef>
+                <a:spcPts val="0"/>
+              </a:spcBef>
+              <a:spcAft>
+                <a:spcPts val="0"/>
+              </a:spcAft>
+              <a:buClrTx/>
+              <a:buSzTx/>
+              <a:buFontTx/>
+              <a:buNone/>
+              <a:tabLst/>
+            </a:pPr>
+            <a:endParaRPr kumimoji="0" lang="fr-FR" sz="1800" b="0" i="0" u="none" strike="noStrike" cap="none" spc="0" normalizeH="0" baseline="0">
+              <a:ln>
+                <a:noFill/>
+              </a:ln>
+              <a:solidFill>
+                <a:srgbClr val="000000"/>
+              </a:solidFill>
+              <a:effectLst/>
+              <a:uFillTx/>
+            </a:endParaRPr>
+          </a:p>
+        </p:txBody>
+      </p:sp>
+      <p:sp>
+        <p:nvSpPr>
+          <p:cNvPr id="12" name="ZoneTexte 11"/>
+          <p:cNvSpPr txBox="1"/>
+          <p:nvPr/>
+        </p:nvSpPr>
+        <p:spPr>
+          <a:xfrm>
+            <a:off x="19656530" y="5066106"/>
+            <a:ext cx="1925206" cy="913711"/>
+          </a:xfrm>
+          <a:prstGeom prst="rect">
+            <a:avLst/>
+          </a:prstGeom>
+          <a:noFill/>
+          <a:ln w="12700" cap="flat">
+            <a:noFill/>
+            <a:miter lim="400000"/>
+          </a:ln>
+          <a:effectLst/>
+          <a:sp3d/>
+        </p:spPr>
+        <p:style>
+          <a:lnRef idx="0">
+            <a:scrgbClr r="0" g="0" b="0"/>
+          </a:lnRef>
+          <a:fillRef idx="0">
+            <a:scrgbClr r="0" g="0" b="0"/>
+          </a:fillRef>
+          <a:effectRef idx="0">
+            <a:scrgbClr r="0" g="0" b="0"/>
+          </a:effectRef>
+          <a:fontRef idx="none"/>
+        </p:style>
+        <p:txBody>
+          <a:bodyPr rot="0" spcFirstLastPara="1" vertOverflow="overflow" horzOverflow="overflow" vert="horz" wrap="none" lIns="71437" tIns="71437" rIns="71437" bIns="71437" numCol="1" spcCol="38100" rtlCol="0" anchor="ctr">
+            <a:spAutoFit/>
+          </a:bodyPr>
+          <a:lstStyle/>
+          <a:p>
+            <a:pPr marL="0" marR="0" indent="0" algn="ctr" defTabSz="821531" rtl="0" fontAlgn="auto" latinLnBrk="0" hangingPunct="0">
+              <a:lnSpc>
+                <a:spcPct val="100000"/>
+              </a:lnSpc>
+              <a:spcBef>
+                <a:spcPts val="0"/>
+              </a:spcBef>
+              <a:spcAft>
+                <a:spcPts val="0"/>
+              </a:spcAft>
+              <a:buClrTx/>
+              <a:buSzTx/>
+              <a:buFontTx/>
+              <a:buNone/>
+              <a:tabLst/>
+            </a:pPr>
+            <a:r>
+              <a:rPr kumimoji="0" lang="fr-FR" sz="5000" b="0" i="0" u="none" strike="noStrike" cap="none" spc="0" normalizeH="0" baseline="0" dirty="0" smtClean="0">
+                <a:ln>
+                  <a:noFill/>
+                </a:ln>
+                <a:solidFill>
+                  <a:srgbClr val="FFFFFF"/>
+                </a:solidFill>
+                <a:effectLst/>
+                <a:uFillTx/>
+                <a:latin typeface="Ink Free" panose="03080402000500000000" pitchFamily="66" charset="0"/>
+                <a:sym typeface="Helvetica Light"/>
+              </a:rPr>
+              <a:t>CI/CD</a:t>
+            </a:r>
+            <a:endParaRPr kumimoji="0" lang="fr-FR" sz="5000" b="0" i="0" u="none" strike="noStrike" cap="none" spc="0" normalizeH="0" baseline="0" dirty="0">
+              <a:ln>
+                <a:noFill/>
+              </a:ln>
+              <a:solidFill>
+                <a:srgbClr val="FFFFFF"/>
+              </a:solidFill>
+              <a:effectLst/>
+              <a:uFillTx/>
+              <a:latin typeface="Ink Free" panose="03080402000500000000" pitchFamily="66" charset="0"/>
+              <a:sym typeface="Helvetica Light"/>
+            </a:endParaRPr>
+          </a:p>
+        </p:txBody>
+      </p:sp>
+      <p:sp>
+        <p:nvSpPr>
+          <p:cNvPr id="13" name="Arc 12"/>
+          <p:cNvSpPr/>
+          <p:nvPr/>
+        </p:nvSpPr>
+        <p:spPr>
+          <a:xfrm rot="20144200">
+            <a:off x="14711953" y="6812963"/>
+            <a:ext cx="6077663" cy="2889849"/>
+          </a:xfrm>
+          <a:prstGeom prst="arc">
+            <a:avLst>
+              <a:gd name="adj1" fmla="val 16200000"/>
+              <a:gd name="adj2" fmla="val 20451464"/>
+            </a:avLst>
+          </a:prstGeom>
+          <a:noFill/>
+          <a:ln w="38100" cap="flat">
+            <a:solidFill>
+              <a:srgbClr val="FFFFFF"/>
+            </a:solidFill>
+            <a:prstDash val="solid"/>
+            <a:miter lim="400000"/>
+          </a:ln>
+          <a:effectLst/>
+          <a:sp3d/>
+        </p:spPr>
+        <p:style>
+          <a:lnRef idx="0">
+            <a:scrgbClr r="0" g="0" b="0"/>
+          </a:lnRef>
+          <a:fillRef idx="0">
+            <a:scrgbClr r="0" g="0" b="0"/>
+          </a:fillRef>
+          <a:effectRef idx="0">
+            <a:scrgbClr r="0" g="0" b="0"/>
+          </a:effectRef>
+          <a:fontRef idx="none"/>
+        </p:style>
+        <p:txBody>
+          <a:bodyPr rot="0" spcFirstLastPara="1" vertOverflow="overflow" horzOverflow="overflow" vert="horz" wrap="square" lIns="91439" tIns="45719" rIns="91439" bIns="45719" numCol="1" spcCol="38100" rtlCol="0" anchor="t">
+            <a:noAutofit/>
+          </a:bodyPr>
+          <a:lstStyle/>
+          <a:p>
+            <a:pPr marL="0" marR="0" indent="0" algn="l" defTabSz="914400" rtl="0" fontAlgn="auto" latinLnBrk="1" hangingPunct="0">
+              <a:lnSpc>
+                <a:spcPct val="100000"/>
+              </a:lnSpc>
+              <a:spcBef>
+                <a:spcPts val="0"/>
+              </a:spcBef>
+              <a:spcAft>
+                <a:spcPts val="0"/>
+              </a:spcAft>
+              <a:buClrTx/>
+              <a:buSzTx/>
+              <a:buFontTx/>
+              <a:buNone/>
+              <a:tabLst/>
+            </a:pPr>
+            <a:endParaRPr lang="fr-FR"/>
+          </a:p>
+        </p:txBody>
+      </p:sp>
+      <p:sp>
+        <p:nvSpPr>
+          <p:cNvPr id="14" name="ZoneTexte 13"/>
+          <p:cNvSpPr txBox="1"/>
+          <p:nvPr/>
+        </p:nvSpPr>
+        <p:spPr>
+          <a:xfrm>
+            <a:off x="20140382" y="6148703"/>
+            <a:ext cx="2991203" cy="913711"/>
+          </a:xfrm>
+          <a:prstGeom prst="rect">
+            <a:avLst/>
+          </a:prstGeom>
+          <a:noFill/>
+          <a:ln w="12700" cap="flat">
+            <a:noFill/>
+            <a:miter lim="400000"/>
+          </a:ln>
+          <a:effectLst/>
+          <a:sp3d/>
+        </p:spPr>
+        <p:style>
+          <a:lnRef idx="0">
+            <a:scrgbClr r="0" g="0" b="0"/>
+          </a:lnRef>
+          <a:fillRef idx="0">
+            <a:scrgbClr r="0" g="0" b="0"/>
+          </a:fillRef>
+          <a:effectRef idx="0">
+            <a:scrgbClr r="0" g="0" b="0"/>
+          </a:effectRef>
+          <a:fontRef idx="none"/>
+        </p:style>
+        <p:txBody>
+          <a:bodyPr rot="0" spcFirstLastPara="1" vertOverflow="overflow" horzOverflow="overflow" vert="horz" wrap="none" lIns="71437" tIns="71437" rIns="71437" bIns="71437" numCol="1" spcCol="38100" rtlCol="0" anchor="ctr">
+            <a:spAutoFit/>
+          </a:bodyPr>
+          <a:lstStyle/>
+          <a:p>
+            <a:pPr marL="0" marR="0" indent="0" algn="ctr" defTabSz="821531" rtl="0" fontAlgn="auto" latinLnBrk="0" hangingPunct="0">
+              <a:lnSpc>
+                <a:spcPct val="100000"/>
+              </a:lnSpc>
+              <a:spcBef>
+                <a:spcPts val="0"/>
+              </a:spcBef>
+              <a:spcAft>
+                <a:spcPts val="0"/>
+              </a:spcAft>
+              <a:buClrTx/>
+              <a:buSzTx/>
+              <a:buFontTx/>
+              <a:buNone/>
+              <a:tabLst/>
+            </a:pPr>
+            <a:r>
+              <a:rPr kumimoji="0" lang="fr-FR" sz="5000" b="0" i="0" u="none" strike="noStrike" cap="none" spc="0" normalizeH="0" baseline="0" dirty="0" smtClean="0">
+                <a:ln>
+                  <a:noFill/>
+                </a:ln>
+                <a:solidFill>
+                  <a:srgbClr val="FFFFFF"/>
+                </a:solidFill>
+                <a:effectLst/>
+                <a:uFillTx/>
+                <a:latin typeface="Ink Free" panose="03080402000500000000" pitchFamily="66" charset="0"/>
+                <a:sym typeface="Helvetica Light"/>
+              </a:rPr>
+              <a:t>SCM (Git)</a:t>
+            </a:r>
+            <a:endParaRPr kumimoji="0" lang="fr-FR" sz="5000" b="0" i="0" u="none" strike="noStrike" cap="none" spc="0" normalizeH="0" baseline="0" dirty="0">
+              <a:ln>
+                <a:noFill/>
+              </a:ln>
+              <a:solidFill>
+                <a:srgbClr val="FFFFFF"/>
+              </a:solidFill>
+              <a:effectLst/>
+              <a:uFillTx/>
+              <a:latin typeface="Ink Free" panose="03080402000500000000" pitchFamily="66" charset="0"/>
+              <a:sym typeface="Helvetica Light"/>
+            </a:endParaRPr>
+          </a:p>
+        </p:txBody>
+      </p:sp>
+      <p:sp>
+        <p:nvSpPr>
+          <p:cNvPr id="16" name="Arc 15"/>
+          <p:cNvSpPr/>
+          <p:nvPr/>
+        </p:nvSpPr>
+        <p:spPr>
+          <a:xfrm>
+            <a:off x="14141991" y="6927074"/>
+            <a:ext cx="6077663" cy="2889849"/>
+          </a:xfrm>
+          <a:prstGeom prst="arc">
+            <a:avLst>
+              <a:gd name="adj1" fmla="val 16200000"/>
+              <a:gd name="adj2" fmla="val 20451464"/>
+            </a:avLst>
+          </a:prstGeom>
+          <a:noFill/>
+          <a:ln w="38100" cap="flat">
+            <a:solidFill>
+              <a:srgbClr val="FFFFFF"/>
+            </a:solidFill>
+            <a:prstDash val="solid"/>
+            <a:miter lim="400000"/>
+          </a:ln>
+          <a:effectLst/>
+          <a:sp3d/>
+        </p:spPr>
+        <p:style>
+          <a:lnRef idx="0">
+            <a:scrgbClr r="0" g="0" b="0"/>
+          </a:lnRef>
+          <a:fillRef idx="0">
+            <a:scrgbClr r="0" g="0" b="0"/>
+          </a:fillRef>
+          <a:effectRef idx="0">
+            <a:scrgbClr r="0" g="0" b="0"/>
+          </a:effectRef>
+          <a:fontRef idx="none"/>
+        </p:style>
+        <p:txBody>
+          <a:bodyPr rot="0" spcFirstLastPara="1" vertOverflow="overflow" horzOverflow="overflow" vert="horz" wrap="square" lIns="91439" tIns="45719" rIns="91439" bIns="45719" numCol="1" spcCol="38100" rtlCol="0" anchor="t">
+            <a:noAutofit/>
+          </a:bodyPr>
+          <a:lstStyle/>
+          <a:p>
+            <a:pPr marL="0" marR="0" indent="0" algn="l" defTabSz="914400" rtl="0" fontAlgn="auto" latinLnBrk="1" hangingPunct="0">
+              <a:lnSpc>
+                <a:spcPct val="100000"/>
+              </a:lnSpc>
+              <a:spcBef>
+                <a:spcPts val="0"/>
+              </a:spcBef>
+              <a:spcAft>
+                <a:spcPts val="0"/>
+              </a:spcAft>
+              <a:buClrTx/>
+              <a:buSzTx/>
+              <a:buFontTx/>
+              <a:buNone/>
+              <a:tabLst/>
+            </a:pPr>
+            <a:endParaRPr kumimoji="0" lang="fr-FR" sz="1800" b="0" i="0" u="none" strike="noStrike" cap="none" spc="0" normalizeH="0" baseline="0">
+              <a:ln>
+                <a:noFill/>
+              </a:ln>
+              <a:solidFill>
+                <a:srgbClr val="000000"/>
+              </a:solidFill>
+              <a:effectLst/>
+              <a:uFillTx/>
+            </a:endParaRPr>
+          </a:p>
+        </p:txBody>
+      </p:sp>
+      <p:sp>
+        <p:nvSpPr>
+          <p:cNvPr id="17" name="ZoneTexte 16"/>
+          <p:cNvSpPr txBox="1"/>
+          <p:nvPr/>
+        </p:nvSpPr>
+        <p:spPr>
+          <a:xfrm>
+            <a:off x="18086354" y="7662128"/>
+            <a:ext cx="5626540" cy="913711"/>
+          </a:xfrm>
+          <a:prstGeom prst="rect">
+            <a:avLst/>
+          </a:prstGeom>
+          <a:noFill/>
+          <a:ln w="12700" cap="flat">
+            <a:noFill/>
+            <a:miter lim="400000"/>
+          </a:ln>
+          <a:effectLst/>
+          <a:sp3d/>
+        </p:spPr>
+        <p:style>
+          <a:lnRef idx="0">
+            <a:scrgbClr r="0" g="0" b="0"/>
+          </a:lnRef>
+          <a:fillRef idx="0">
+            <a:scrgbClr r="0" g="0" b="0"/>
+          </a:fillRef>
+          <a:effectRef idx="0">
+            <a:scrgbClr r="0" g="0" b="0"/>
+          </a:effectRef>
+          <a:fontRef idx="none"/>
+        </p:style>
+        <p:txBody>
+          <a:bodyPr rot="0" spcFirstLastPara="1" vertOverflow="overflow" horzOverflow="overflow" vert="horz" wrap="none" lIns="71437" tIns="71437" rIns="71437" bIns="71437" numCol="1" spcCol="38100" rtlCol="0" anchor="ctr">
+            <a:spAutoFit/>
+          </a:bodyPr>
+          <a:lstStyle/>
+          <a:p>
+            <a:pPr marL="0" marR="0" indent="0" algn="ctr" defTabSz="821531" rtl="0" fontAlgn="auto" latinLnBrk="0" hangingPunct="0">
+              <a:lnSpc>
+                <a:spcPct val="100000"/>
+              </a:lnSpc>
+              <a:spcBef>
+                <a:spcPts val="0"/>
+              </a:spcBef>
+              <a:spcAft>
+                <a:spcPts val="0"/>
+              </a:spcAft>
+              <a:buClrTx/>
+              <a:buSzTx/>
+              <a:buFontTx/>
+              <a:buNone/>
+              <a:tabLst/>
+            </a:pPr>
+            <a:r>
+              <a:rPr kumimoji="0" lang="fr-FR" sz="5000" b="0" i="0" u="none" strike="noStrike" cap="none" spc="0" normalizeH="0" baseline="0" dirty="0" smtClean="0">
+                <a:ln>
+                  <a:noFill/>
+                </a:ln>
+                <a:solidFill>
+                  <a:srgbClr val="FFFFFF"/>
+                </a:solidFill>
+                <a:effectLst/>
+                <a:uFillTx/>
+                <a:latin typeface="Ink Free" panose="03080402000500000000" pitchFamily="66" charset="0"/>
+                <a:sym typeface="Helvetica Light"/>
+              </a:rPr>
+              <a:t>Docker</a:t>
+            </a:r>
+            <a:r>
+              <a:rPr kumimoji="0" lang="fr-FR" sz="5000" b="0" i="0" u="none" strike="noStrike" cap="none" spc="0" normalizeH="0" dirty="0" smtClean="0">
+                <a:ln>
+                  <a:noFill/>
+                </a:ln>
+                <a:solidFill>
+                  <a:srgbClr val="FFFFFF"/>
+                </a:solidFill>
+                <a:effectLst/>
+                <a:uFillTx/>
+                <a:latin typeface="Ink Free" panose="03080402000500000000" pitchFamily="66" charset="0"/>
+                <a:sym typeface="Helvetica Light"/>
+              </a:rPr>
+              <a:t> / </a:t>
+            </a:r>
+            <a:r>
+              <a:rPr kumimoji="0" lang="fr-FR" sz="5000" b="0" i="0" u="none" strike="noStrike" cap="none" spc="0" normalizeH="0" baseline="0" dirty="0" err="1" smtClean="0">
+                <a:ln>
+                  <a:noFill/>
+                </a:ln>
+                <a:solidFill>
+                  <a:srgbClr val="FFFFFF"/>
+                </a:solidFill>
+                <a:effectLst/>
+                <a:uFillTx/>
+                <a:latin typeface="Ink Free" panose="03080402000500000000" pitchFamily="66" charset="0"/>
+                <a:sym typeface="Helvetica Light"/>
+              </a:rPr>
+              <a:t>Kubernetes</a:t>
+            </a:r>
+            <a:endParaRPr kumimoji="0" lang="fr-FR" sz="5000" b="0" i="0" u="none" strike="noStrike" cap="none" spc="0" normalizeH="0" baseline="0" dirty="0">
+              <a:ln>
+                <a:noFill/>
+              </a:ln>
+              <a:solidFill>
+                <a:srgbClr val="FFFFFF"/>
+              </a:solidFill>
+              <a:effectLst/>
+              <a:uFillTx/>
+              <a:latin typeface="Ink Free" panose="03080402000500000000" pitchFamily="66" charset="0"/>
+              <a:sym typeface="Helvetica Light"/>
+            </a:endParaRPr>
+          </a:p>
+        </p:txBody>
+      </p:sp>
+      <p:sp>
+        <p:nvSpPr>
+          <p:cNvPr id="18" name="Arc 17"/>
+          <p:cNvSpPr/>
+          <p:nvPr/>
+        </p:nvSpPr>
+        <p:spPr>
+          <a:xfrm rot="20083695">
+            <a:off x="47583" y="7476831"/>
+            <a:ext cx="6087909" cy="2727629"/>
+          </a:xfrm>
+          <a:prstGeom prst="arc">
+            <a:avLst>
+              <a:gd name="adj1" fmla="val 16200000"/>
+              <a:gd name="adj2" fmla="val 18999434"/>
+            </a:avLst>
+          </a:prstGeom>
+          <a:noFill/>
+          <a:ln w="38100" cap="flat">
+            <a:solidFill>
+              <a:srgbClr val="FFFFFF"/>
+            </a:solidFill>
+            <a:prstDash val="solid"/>
+            <a:miter lim="400000"/>
+          </a:ln>
+          <a:effectLst/>
+          <a:sp3d/>
+        </p:spPr>
+        <p:style>
+          <a:lnRef idx="0">
+            <a:scrgbClr r="0" g="0" b="0"/>
+          </a:lnRef>
+          <a:fillRef idx="0">
+            <a:scrgbClr r="0" g="0" b="0"/>
+          </a:fillRef>
+          <a:effectRef idx="0">
+            <a:scrgbClr r="0" g="0" b="0"/>
+          </a:effectRef>
+          <a:fontRef idx="none"/>
+        </p:style>
+        <p:txBody>
+          <a:bodyPr rot="0" spcFirstLastPara="1" vertOverflow="overflow" horzOverflow="overflow" vert="horz" wrap="square" lIns="91439" tIns="45719" rIns="91439" bIns="45719" numCol="1" spcCol="38100" rtlCol="0" anchor="t">
+            <a:noAutofit/>
+          </a:bodyPr>
+          <a:lstStyle/>
+          <a:p>
+            <a:pPr marL="0" marR="0" indent="0" algn="l" defTabSz="914400" rtl="0" fontAlgn="auto" latinLnBrk="1" hangingPunct="0">
+              <a:lnSpc>
+                <a:spcPct val="100000"/>
+              </a:lnSpc>
+              <a:spcBef>
+                <a:spcPts val="0"/>
+              </a:spcBef>
+              <a:spcAft>
+                <a:spcPts val="0"/>
+              </a:spcAft>
+              <a:buClrTx/>
+              <a:buSzTx/>
+              <a:buFontTx/>
+              <a:buNone/>
+              <a:tabLst/>
+            </a:pPr>
+            <a:endParaRPr kumimoji="0" lang="fr-FR" sz="1800" b="0" i="0" u="none" strike="noStrike" cap="none" spc="0" normalizeH="0" baseline="0">
+              <a:ln>
+                <a:noFill/>
+              </a:ln>
+              <a:solidFill>
+                <a:srgbClr val="000000"/>
+              </a:solidFill>
+              <a:effectLst/>
+              <a:uFillTx/>
+            </a:endParaRPr>
+          </a:p>
+        </p:txBody>
+      </p:sp>
+      <p:sp>
+        <p:nvSpPr>
+          <p:cNvPr id="19" name="ZoneTexte 18"/>
+          <p:cNvSpPr txBox="1"/>
+          <p:nvPr/>
+        </p:nvSpPr>
+        <p:spPr>
+          <a:xfrm>
+            <a:off x="581852" y="7712180"/>
+            <a:ext cx="1782538" cy="913711"/>
+          </a:xfrm>
+          <a:prstGeom prst="rect">
+            <a:avLst/>
+          </a:prstGeom>
+          <a:noFill/>
+          <a:ln w="12700" cap="flat">
+            <a:noFill/>
+            <a:miter lim="400000"/>
+          </a:ln>
+          <a:effectLst/>
+          <a:sp3d/>
+        </p:spPr>
+        <p:style>
+          <a:lnRef idx="0">
+            <a:scrgbClr r="0" g="0" b="0"/>
+          </a:lnRef>
+          <a:fillRef idx="0">
+            <a:scrgbClr r="0" g="0" b="0"/>
+          </a:fillRef>
+          <a:effectRef idx="0">
+            <a:scrgbClr r="0" g="0" b="0"/>
+          </a:effectRef>
+          <a:fontRef idx="none"/>
+        </p:style>
+        <p:txBody>
+          <a:bodyPr rot="0" spcFirstLastPara="1" vertOverflow="overflow" horzOverflow="overflow" vert="horz" wrap="none" lIns="71437" tIns="71437" rIns="71437" bIns="71437" numCol="1" spcCol="38100" rtlCol="0" anchor="ctr">
+            <a:spAutoFit/>
+          </a:bodyPr>
+          <a:lstStyle/>
+          <a:p>
+            <a:pPr marL="0" marR="0" indent="0" algn="ctr" defTabSz="821531" rtl="0" fontAlgn="auto" latinLnBrk="0" hangingPunct="0">
+              <a:lnSpc>
+                <a:spcPct val="100000"/>
+              </a:lnSpc>
+              <a:spcBef>
+                <a:spcPts val="0"/>
+              </a:spcBef>
+              <a:spcAft>
+                <a:spcPts val="0"/>
+              </a:spcAft>
+              <a:buClrTx/>
+              <a:buSzTx/>
+              <a:buFontTx/>
+              <a:buNone/>
+              <a:tabLst/>
+            </a:pPr>
+            <a:r>
+              <a:rPr kumimoji="0" lang="fr-FR" sz="5000" b="0" i="0" u="none" strike="noStrike" cap="none" spc="0" normalizeH="0" baseline="0" dirty="0" smtClean="0">
+                <a:ln>
+                  <a:noFill/>
+                </a:ln>
+                <a:solidFill>
+                  <a:srgbClr val="FFFFFF"/>
+                </a:solidFill>
+                <a:effectLst/>
+                <a:uFillTx/>
+                <a:latin typeface="Ink Free" panose="03080402000500000000" pitchFamily="66" charset="0"/>
+                <a:sym typeface="Helvetica Light"/>
+              </a:rPr>
+              <a:t>Tests</a:t>
+            </a:r>
+            <a:endParaRPr kumimoji="0" lang="fr-FR" sz="5000" b="0" i="0" u="none" strike="noStrike" cap="none" spc="0" normalizeH="0" baseline="0" dirty="0">
+              <a:ln>
+                <a:noFill/>
+              </a:ln>
+              <a:solidFill>
+                <a:srgbClr val="FFFFFF"/>
+              </a:solidFill>
+              <a:effectLst/>
+              <a:uFillTx/>
+              <a:latin typeface="Ink Free" panose="03080402000500000000" pitchFamily="66" charset="0"/>
+              <a:sym typeface="Helvetica Light"/>
+            </a:endParaRPr>
+          </a:p>
+        </p:txBody>
+      </p:sp>
+      <p:sp>
+        <p:nvSpPr>
+          <p:cNvPr id="20" name="ZoneTexte 19"/>
+          <p:cNvSpPr txBox="1"/>
+          <p:nvPr/>
+        </p:nvSpPr>
+        <p:spPr>
+          <a:xfrm>
+            <a:off x="596862" y="3098322"/>
+            <a:ext cx="1843452" cy="913711"/>
+          </a:xfrm>
+          <a:prstGeom prst="rect">
+            <a:avLst/>
+          </a:prstGeom>
+          <a:noFill/>
+          <a:ln w="12700" cap="flat">
+            <a:noFill/>
+            <a:miter lim="400000"/>
+          </a:ln>
+          <a:effectLst/>
+          <a:sp3d/>
+        </p:spPr>
+        <p:style>
+          <a:lnRef idx="0">
+            <a:scrgbClr r="0" g="0" b="0"/>
+          </a:lnRef>
+          <a:fillRef idx="0">
+            <a:scrgbClr r="0" g="0" b="0"/>
+          </a:fillRef>
+          <a:effectRef idx="0">
+            <a:scrgbClr r="0" g="0" b="0"/>
+          </a:effectRef>
+          <a:fontRef idx="none"/>
+        </p:style>
+        <p:txBody>
+          <a:bodyPr rot="0" spcFirstLastPara="1" vertOverflow="overflow" horzOverflow="overflow" vert="horz" wrap="none" lIns="71437" tIns="71437" rIns="71437" bIns="71437" numCol="1" spcCol="38100" rtlCol="0" anchor="ctr">
+            <a:spAutoFit/>
+          </a:bodyPr>
+          <a:lstStyle/>
+          <a:p>
+            <a:pPr marL="0" marR="0" indent="0" algn="ctr" defTabSz="821531" rtl="0" fontAlgn="auto" latinLnBrk="0" hangingPunct="0">
+              <a:lnSpc>
+                <a:spcPct val="100000"/>
+              </a:lnSpc>
+              <a:spcBef>
+                <a:spcPts val="0"/>
+              </a:spcBef>
+              <a:spcAft>
+                <a:spcPts val="0"/>
+              </a:spcAft>
+              <a:buClrTx/>
+              <a:buSzTx/>
+              <a:buFontTx/>
+              <a:buNone/>
+              <a:tabLst/>
+            </a:pPr>
+            <a:r>
+              <a:rPr kumimoji="0" lang="fr-FR" sz="5000" b="0" i="0" u="none" strike="noStrike" cap="none" spc="0" normalizeH="0" baseline="0" dirty="0" smtClean="0">
+                <a:ln>
+                  <a:noFill/>
+                </a:ln>
+                <a:solidFill>
+                  <a:srgbClr val="FFFFFF"/>
+                </a:solidFill>
+                <a:effectLst/>
+                <a:uFillTx/>
+                <a:latin typeface="Ink Free" panose="03080402000500000000" pitchFamily="66" charset="0"/>
+                <a:sym typeface="Helvetica Light"/>
+              </a:rPr>
+              <a:t>HTTP</a:t>
+            </a:r>
+          </a:p>
+        </p:txBody>
+      </p:sp>
+      <p:sp>
+        <p:nvSpPr>
+          <p:cNvPr id="21" name="ZoneTexte 20"/>
+          <p:cNvSpPr txBox="1"/>
+          <p:nvPr/>
+        </p:nvSpPr>
+        <p:spPr>
+          <a:xfrm>
+            <a:off x="553979" y="5062126"/>
+            <a:ext cx="1869100" cy="913712"/>
+          </a:xfrm>
+          <a:prstGeom prst="rect">
+            <a:avLst/>
+          </a:prstGeom>
+          <a:noFill/>
+          <a:ln w="12700" cap="flat">
+            <a:noFill/>
+            <a:miter lim="400000"/>
+          </a:ln>
+          <a:effectLst/>
+          <a:sp3d/>
+        </p:spPr>
+        <p:style>
+          <a:lnRef idx="0">
+            <a:scrgbClr r="0" g="0" b="0"/>
+          </a:lnRef>
+          <a:fillRef idx="0">
+            <a:scrgbClr r="0" g="0" b="0"/>
+          </a:fillRef>
+          <a:effectRef idx="0">
+            <a:scrgbClr r="0" g="0" b="0"/>
+          </a:effectRef>
+          <a:fontRef idx="none"/>
+        </p:style>
+        <p:txBody>
+          <a:bodyPr rot="0" spcFirstLastPara="1" vertOverflow="overflow" horzOverflow="overflow" vert="horz" wrap="none" lIns="71437" tIns="71437" rIns="71437" bIns="71437" numCol="1" spcCol="38100" rtlCol="0" anchor="ctr">
+            <a:spAutoFit/>
+          </a:bodyPr>
+          <a:lstStyle/>
+          <a:p>
+            <a:pPr marL="0" marR="0" indent="0" algn="ctr" defTabSz="821531" rtl="0" fontAlgn="auto" latinLnBrk="0" hangingPunct="0">
+              <a:lnSpc>
+                <a:spcPct val="100000"/>
+              </a:lnSpc>
+              <a:spcBef>
+                <a:spcPts val="0"/>
+              </a:spcBef>
+              <a:spcAft>
+                <a:spcPts val="0"/>
+              </a:spcAft>
+              <a:buClrTx/>
+              <a:buSzTx/>
+              <a:buFontTx/>
+              <a:buNone/>
+              <a:tabLst/>
+            </a:pPr>
+            <a:r>
+              <a:rPr kumimoji="0" lang="fr-FR" sz="5000" b="0" i="0" u="none" strike="noStrike" cap="none" spc="0" normalizeH="0" baseline="0" dirty="0" smtClean="0">
+                <a:ln>
+                  <a:noFill/>
+                </a:ln>
+                <a:solidFill>
+                  <a:srgbClr val="FFFFFF"/>
+                </a:solidFill>
+                <a:effectLst/>
+                <a:uFillTx/>
+                <a:latin typeface="Ink Free" panose="03080402000500000000" pitchFamily="66" charset="0"/>
+                <a:sym typeface="Helvetica Light"/>
+              </a:rPr>
+              <a:t>AMQP</a:t>
+            </a:r>
+          </a:p>
+        </p:txBody>
+      </p:sp>
+      <p:sp>
+        <p:nvSpPr>
+          <p:cNvPr id="22" name="Arc 21"/>
+          <p:cNvSpPr/>
+          <p:nvPr/>
+        </p:nvSpPr>
+        <p:spPr>
+          <a:xfrm rot="19846069">
+            <a:off x="1553042" y="4839235"/>
+            <a:ext cx="2709009" cy="1539985"/>
+          </a:xfrm>
+          <a:prstGeom prst="arc">
+            <a:avLst>
+              <a:gd name="adj1" fmla="val 16200000"/>
+              <a:gd name="adj2" fmla="val 20451464"/>
+            </a:avLst>
+          </a:prstGeom>
+          <a:noFill/>
+          <a:ln w="38100" cap="flat">
+            <a:solidFill>
+              <a:srgbClr val="FFFFFF"/>
+            </a:solidFill>
+            <a:prstDash val="solid"/>
+            <a:miter lim="400000"/>
+          </a:ln>
+          <a:effectLst/>
+          <a:sp3d/>
+        </p:spPr>
+        <p:style>
+          <a:lnRef idx="0">
+            <a:scrgbClr r="0" g="0" b="0"/>
+          </a:lnRef>
+          <a:fillRef idx="0">
+            <a:scrgbClr r="0" g="0" b="0"/>
+          </a:fillRef>
+          <a:effectRef idx="0">
+            <a:scrgbClr r="0" g="0" b="0"/>
+          </a:effectRef>
+          <a:fontRef idx="none"/>
+        </p:style>
+        <p:txBody>
+          <a:bodyPr rot="0" spcFirstLastPara="1" vertOverflow="overflow" horzOverflow="overflow" vert="horz" wrap="square" lIns="91439" tIns="45719" rIns="91439" bIns="45719" numCol="1" spcCol="38100" rtlCol="0" anchor="t">
+            <a:noAutofit/>
+          </a:bodyPr>
+          <a:lstStyle/>
+          <a:p>
+            <a:pPr marL="0" marR="0" indent="0" algn="l" defTabSz="914400" rtl="0" fontAlgn="auto" latinLnBrk="1" hangingPunct="0">
+              <a:lnSpc>
+                <a:spcPct val="100000"/>
+              </a:lnSpc>
+              <a:spcBef>
+                <a:spcPts val="0"/>
+              </a:spcBef>
+              <a:spcAft>
+                <a:spcPts val="0"/>
+              </a:spcAft>
+              <a:buClrTx/>
+              <a:buSzTx/>
+              <a:buFontTx/>
+              <a:buNone/>
+              <a:tabLst/>
+            </a:pPr>
+            <a:endParaRPr kumimoji="0" lang="fr-FR" sz="1800" b="0" i="0" u="none" strike="noStrike" cap="none" spc="0" normalizeH="0" baseline="0">
+              <a:ln>
+                <a:noFill/>
+              </a:ln>
+              <a:solidFill>
+                <a:srgbClr val="000000"/>
+              </a:solidFill>
+              <a:effectLst/>
+              <a:uFillTx/>
+            </a:endParaRPr>
+          </a:p>
+        </p:txBody>
+      </p:sp>
+      <p:sp>
+        <p:nvSpPr>
+          <p:cNvPr id="23" name="Arc 22"/>
+          <p:cNvSpPr/>
+          <p:nvPr/>
+        </p:nvSpPr>
+        <p:spPr>
+          <a:xfrm rot="713671">
+            <a:off x="1194691" y="4108378"/>
+            <a:ext cx="2709009" cy="1539985"/>
+          </a:xfrm>
+          <a:prstGeom prst="arc">
+            <a:avLst>
+              <a:gd name="adj1" fmla="val 16200000"/>
+              <a:gd name="adj2" fmla="val 20451464"/>
+            </a:avLst>
+          </a:prstGeom>
+          <a:noFill/>
+          <a:ln w="38100" cap="flat">
+            <a:solidFill>
+              <a:srgbClr val="FFFFFF"/>
+            </a:solidFill>
+            <a:prstDash val="solid"/>
+            <a:miter lim="400000"/>
+          </a:ln>
+          <a:effectLst/>
+          <a:sp3d/>
+        </p:spPr>
+        <p:style>
+          <a:lnRef idx="0">
+            <a:scrgbClr r="0" g="0" b="0"/>
+          </a:lnRef>
+          <a:fillRef idx="0">
+            <a:scrgbClr r="0" g="0" b="0"/>
+          </a:fillRef>
+          <a:effectRef idx="0">
+            <a:scrgbClr r="0" g="0" b="0"/>
+          </a:effectRef>
+          <a:fontRef idx="none"/>
+        </p:style>
+        <p:txBody>
+          <a:bodyPr rot="0" spcFirstLastPara="1" vertOverflow="overflow" horzOverflow="overflow" vert="horz" wrap="square" lIns="91439" tIns="45719" rIns="91439" bIns="45719" numCol="1" spcCol="38100" rtlCol="0" anchor="t">
+            <a:noAutofit/>
+          </a:bodyPr>
+          <a:lstStyle/>
+          <a:p>
+            <a:pPr marL="0" marR="0" indent="0" algn="l" defTabSz="914400" rtl="0" fontAlgn="auto" latinLnBrk="1" hangingPunct="0">
+              <a:lnSpc>
+                <a:spcPct val="100000"/>
+              </a:lnSpc>
+              <a:spcBef>
+                <a:spcPts val="0"/>
+              </a:spcBef>
+              <a:spcAft>
+                <a:spcPts val="0"/>
+              </a:spcAft>
+              <a:buClrTx/>
+              <a:buSzTx/>
+              <a:buFontTx/>
+              <a:buNone/>
+              <a:tabLst/>
+            </a:pPr>
+            <a:endParaRPr kumimoji="0" lang="fr-FR" sz="1800" b="0" i="0" u="none" strike="noStrike" cap="none" spc="0" normalizeH="0" baseline="0">
+              <a:ln>
+                <a:noFill/>
+              </a:ln>
+              <a:solidFill>
+                <a:srgbClr val="000000"/>
+              </a:solidFill>
+              <a:effectLst/>
+              <a:uFillTx/>
+            </a:endParaRPr>
+          </a:p>
+        </p:txBody>
+      </p:sp>
+      <p:sp>
+        <p:nvSpPr>
+          <p:cNvPr id="24" name="ZoneTexte 23"/>
+          <p:cNvSpPr txBox="1"/>
+          <p:nvPr/>
+        </p:nvSpPr>
+        <p:spPr>
+          <a:xfrm>
+            <a:off x="17553563" y="3981379"/>
+            <a:ext cx="1006685" cy="913711"/>
+          </a:xfrm>
+          <a:prstGeom prst="rect">
+            <a:avLst/>
+          </a:prstGeom>
+          <a:noFill/>
+          <a:ln w="12700" cap="flat">
+            <a:noFill/>
+            <a:miter lim="400000"/>
+          </a:ln>
+          <a:effectLst/>
+          <a:sp3d/>
+        </p:spPr>
+        <p:style>
+          <a:lnRef idx="0">
+            <a:scrgbClr r="0" g="0" b="0"/>
+          </a:lnRef>
+          <a:fillRef idx="0">
+            <a:scrgbClr r="0" g="0" b="0"/>
+          </a:fillRef>
+          <a:effectRef idx="0">
+            <a:scrgbClr r="0" g="0" b="0"/>
+          </a:effectRef>
+          <a:fontRef idx="none"/>
+        </p:style>
+        <p:txBody>
+          <a:bodyPr rot="0" spcFirstLastPara="1" vertOverflow="overflow" horzOverflow="overflow" vert="horz" wrap="none" lIns="71437" tIns="71437" rIns="71437" bIns="71437" numCol="1" spcCol="38100" rtlCol="0" anchor="ctr">
+            <a:spAutoFit/>
+          </a:bodyPr>
+          <a:lstStyle/>
+          <a:p>
+            <a:pPr marL="0" marR="0" indent="0" algn="ctr" defTabSz="821531" rtl="0" fontAlgn="auto" latinLnBrk="0" hangingPunct="0">
+              <a:lnSpc>
+                <a:spcPct val="100000"/>
+              </a:lnSpc>
+              <a:spcBef>
+                <a:spcPts val="0"/>
+              </a:spcBef>
+              <a:spcAft>
+                <a:spcPts val="0"/>
+              </a:spcAft>
+              <a:buClrTx/>
+              <a:buSzTx/>
+              <a:buFontTx/>
+              <a:buNone/>
+              <a:tabLst/>
+            </a:pPr>
+            <a:r>
+              <a:rPr kumimoji="0" lang="fr-FR" sz="5000" b="0" i="0" u="none" strike="noStrike" cap="none" spc="0" normalizeH="0" baseline="0" dirty="0" smtClean="0">
+                <a:ln>
+                  <a:noFill/>
+                </a:ln>
+                <a:solidFill>
+                  <a:srgbClr val="FFFFFF"/>
+                </a:solidFill>
+                <a:effectLst/>
+                <a:uFillTx/>
+                <a:latin typeface="Ink Free" panose="03080402000500000000" pitchFamily="66" charset="0"/>
+                <a:sym typeface="Helvetica Light"/>
+              </a:rPr>
+              <a:t>DB</a:t>
+            </a:r>
+            <a:endParaRPr kumimoji="0" lang="fr-FR" sz="5000" b="0" i="0" u="none" strike="noStrike" cap="none" spc="0" normalizeH="0" baseline="0" dirty="0">
+              <a:ln>
+                <a:noFill/>
+              </a:ln>
+              <a:solidFill>
+                <a:srgbClr val="FFFFFF"/>
+              </a:solidFill>
+              <a:effectLst/>
+              <a:uFillTx/>
+              <a:latin typeface="Ink Free" panose="03080402000500000000" pitchFamily="66" charset="0"/>
+              <a:sym typeface="Helvetica Light"/>
+            </a:endParaRPr>
+          </a:p>
+        </p:txBody>
+      </p:sp>
+      <p:sp>
+        <p:nvSpPr>
+          <p:cNvPr id="27" name="Arc 26"/>
+          <p:cNvSpPr/>
+          <p:nvPr/>
+        </p:nvSpPr>
+        <p:spPr>
+          <a:xfrm rot="20228147">
+            <a:off x="11734446" y="4479307"/>
+            <a:ext cx="6087909" cy="2727629"/>
+          </a:xfrm>
+          <a:prstGeom prst="arc">
+            <a:avLst>
+              <a:gd name="adj1" fmla="val 16200000"/>
+              <a:gd name="adj2" fmla="val 20856006"/>
+            </a:avLst>
+          </a:prstGeom>
+          <a:noFill/>
+          <a:ln w="38100" cap="flat">
+            <a:solidFill>
+              <a:srgbClr val="FFFFFF"/>
+            </a:solidFill>
+            <a:prstDash val="solid"/>
+            <a:miter lim="400000"/>
+          </a:ln>
+          <a:effectLst/>
+          <a:sp3d/>
+        </p:spPr>
+        <p:style>
+          <a:lnRef idx="0">
+            <a:scrgbClr r="0" g="0" b="0"/>
+          </a:lnRef>
+          <a:fillRef idx="0">
+            <a:scrgbClr r="0" g="0" b="0"/>
+          </a:fillRef>
+          <a:effectRef idx="0">
+            <a:scrgbClr r="0" g="0" b="0"/>
+          </a:effectRef>
+          <a:fontRef idx="none"/>
+        </p:style>
+        <p:txBody>
+          <a:bodyPr rot="0" spcFirstLastPara="1" vertOverflow="overflow" horzOverflow="overflow" vert="horz" wrap="square" lIns="91439" tIns="45719" rIns="91439" bIns="45719" numCol="1" spcCol="38100" rtlCol="0" anchor="t">
+            <a:noAutofit/>
+          </a:bodyPr>
+          <a:lstStyle/>
+          <a:p>
+            <a:pPr marL="0" marR="0" indent="0" algn="l" defTabSz="914400" rtl="0" fontAlgn="auto" latinLnBrk="1" hangingPunct="0">
+              <a:lnSpc>
+                <a:spcPct val="100000"/>
+              </a:lnSpc>
+              <a:spcBef>
+                <a:spcPts val="0"/>
+              </a:spcBef>
+              <a:spcAft>
+                <a:spcPts val="0"/>
+              </a:spcAft>
+              <a:buClrTx/>
+              <a:buSzTx/>
+              <a:buFontTx/>
+              <a:buNone/>
+              <a:tabLst/>
+            </a:pPr>
+            <a:endParaRPr kumimoji="0" lang="fr-FR" sz="1800" b="0" i="0" u="none" strike="noStrike" cap="none" spc="0" normalizeH="0" baseline="0">
+              <a:ln>
+                <a:noFill/>
+              </a:ln>
+              <a:solidFill>
+                <a:srgbClr val="000000"/>
+              </a:solidFill>
+              <a:effectLst/>
+              <a:uFillTx/>
+            </a:endParaRPr>
+          </a:p>
+        </p:txBody>
+      </p:sp>
     </p:spTree>
     <p:extLst>
       <p:ext uri="{BB962C8B-B14F-4D97-AF65-F5344CB8AC3E}">
@@ -5193,6 +6570,13 @@
     <a:masterClrMapping/>
   </p:clrMapOvr>
   <p:transition spd="med"/>
+  <p:timing>
+    <p:tnLst>
+      <p:par>
+        <p:cTn id="1" dur="indefinite" restart="never" nodeType="tmRoot"/>
+      </p:par>
+    </p:tnLst>
+  </p:timing>
 </p:sld>
 </file>
 
@@ -5288,6 +6672,146 @@
 </file>
 
 <file path=ppt/slides/slide5.xml><?xml version="1.0" encoding="utf-8"?>
+<p:sld xmlns:a="http://schemas.openxmlformats.org/drawingml/2006/main" xmlns:r="http://schemas.openxmlformats.org/officeDocument/2006/relationships" xmlns:p="http://schemas.openxmlformats.org/presentationml/2006/main">
+  <p:cSld>
+    <p:spTree>
+      <p:nvGrpSpPr>
+        <p:cNvPr id="1" name=""/>
+        <p:cNvGrpSpPr/>
+        <p:nvPr/>
+      </p:nvGrpSpPr>
+      <p:grpSpPr>
+        <a:xfrm>
+          <a:off x="0" y="0"/>
+          <a:ext cx="0" cy="0"/>
+          <a:chOff x="0" y="0"/>
+          <a:chExt cx="0" cy="0"/>
+        </a:xfrm>
+      </p:grpSpPr>
+      <p:sp>
+        <p:nvSpPr>
+          <p:cNvPr id="9" name="Espace réservé du texte 8"/>
+          <p:cNvSpPr>
+            <a:spLocks noGrp="1"/>
+          </p:cNvSpPr>
+          <p:nvPr>
+            <p:ph type="body" idx="1"/>
+          </p:nvPr>
+        </p:nvSpPr>
+        <p:spPr/>
+        <p:txBody>
+          <a:bodyPr/>
+          <a:lstStyle/>
+          <a:p>
+            <a:r>
+              <a:rPr lang="fr-FR" dirty="0" smtClean="0"/>
+              <a:t>API simple à prendre en main</a:t>
+            </a:r>
+          </a:p>
+          <a:p>
+            <a:r>
+              <a:rPr lang="fr-FR" dirty="0" smtClean="0"/>
+              <a:t>Composants graphiques prêts à l’emploi</a:t>
+            </a:r>
+          </a:p>
+          <a:p>
+            <a:r>
+              <a:rPr lang="fr-FR" dirty="0" smtClean="0"/>
+              <a:t>Accès à toute l’API </a:t>
+            </a:r>
+            <a:r>
+              <a:rPr lang="fr-FR" dirty="0" err="1" smtClean="0"/>
+              <a:t>NodeJS</a:t>
+            </a:r>
+            <a:r>
+              <a:rPr lang="fr-FR" dirty="0" smtClean="0"/>
+              <a:t> (pas de </a:t>
+            </a:r>
+            <a:r>
+              <a:rPr lang="fr-FR" dirty="0" err="1" smtClean="0"/>
+              <a:t>sandbox</a:t>
+            </a:r>
+            <a:r>
+              <a:rPr lang="fr-FR" dirty="0" smtClean="0"/>
+              <a:t>)</a:t>
+            </a:r>
+            <a:endParaRPr lang="fr-FR" dirty="0"/>
+          </a:p>
+        </p:txBody>
+      </p:sp>
+      <p:sp>
+        <p:nvSpPr>
+          <p:cNvPr id="2" name="Titre 1"/>
+          <p:cNvSpPr>
+            <a:spLocks noGrp="1"/>
+          </p:cNvSpPr>
+          <p:nvPr>
+            <p:ph type="title" idx="4294967295"/>
+          </p:nvPr>
+        </p:nvSpPr>
+        <p:spPr>
+          <a:xfrm>
+            <a:off x="0" y="136525"/>
+            <a:ext cx="24384000" cy="2579688"/>
+          </a:xfrm>
+        </p:spPr>
+        <p:txBody>
+          <a:bodyPr/>
+          <a:lstStyle/>
+          <a:p>
+            <a:r>
+              <a:rPr lang="fr-FR" dirty="0" smtClean="0"/>
+              <a:t>Conclusion</a:t>
+            </a:r>
+            <a:endParaRPr lang="fr-FR" dirty="0"/>
+          </a:p>
+        </p:txBody>
+      </p:sp>
+      <p:pic>
+        <p:nvPicPr>
+          <p:cNvPr id="8" name="Image 7"/>
+          <p:cNvPicPr>
+            <a:picLocks noChangeAspect="1"/>
+          </p:cNvPicPr>
+          <p:nvPr/>
+        </p:nvPicPr>
+        <p:blipFill>
+          <a:blip r:embed="rId2" cstate="print">
+            <a:extLst>
+              <a:ext uri="{28A0092B-C50C-407E-A947-70E740481C1C}">
+                <a14:useLocalDpi xmlns:a14="http://schemas.microsoft.com/office/drawing/2010/main" val="0"/>
+              </a:ext>
+            </a:extLst>
+          </a:blip>
+          <a:stretch>
+            <a:fillRect/>
+          </a:stretch>
+        </p:blipFill>
+        <p:spPr>
+          <a:xfrm>
+            <a:off x="15821509" y="12785049"/>
+            <a:ext cx="2718629" cy="1047659"/>
+          </a:xfrm>
+          <a:prstGeom prst="rect">
+            <a:avLst/>
+          </a:prstGeom>
+        </p:spPr>
+      </p:pic>
+    </p:spTree>
+    <p:extLst>
+      <p:ext uri="{BB962C8B-B14F-4D97-AF65-F5344CB8AC3E}">
+        <p14:creationId xmlns:p14="http://schemas.microsoft.com/office/powerpoint/2010/main" val="3287861579"/>
+      </p:ext>
+    </p:extLst>
+  </p:cSld>
+  <p:clrMapOvr>
+    <a:masterClrMapping/>
+  </p:clrMapOvr>
+  <p:transition spd="med"/>
+</p:sld>
+</file>
+
+<file path=ppt/slides/slide6.xml><?xml version="1.0" encoding="utf-8"?>
 <p:sld xmlns:a="http://schemas.openxmlformats.org/drawingml/2006/main" xmlns:r="http://schemas.openxmlformats.org/officeDocument/2006/relationships" xmlns:p="http://schemas.openxmlformats.org/presentationml/2006/main">
   <p:cSld>
     <p:spTree>

</xml_diff>

<commit_message>
add colors to title
</commit_message>
<xml_diff>
--- a/Etendre VS Code - Devoxx 2019.pptx
+++ b/Etendre VS Code - Devoxx 2019.pptx
@@ -3894,10 +3894,28 @@
             </a:pPr>
             <a:r>
               <a:rPr lang="fr-FR" dirty="0"/>
-              <a:t>ÉTENDRE VS </a:t>
-            </a:r>
-            <a:r>
-              <a:rPr lang="fr-FR" dirty="0" smtClean="0"/>
+              <a:t>ÉTENDRE </a:t>
+            </a:r>
+            <a:r>
+              <a:rPr lang="fr-FR" dirty="0">
+                <a:solidFill>
+                  <a:schemeClr val="accent1">
+                    <a:lumMod val="40000"/>
+                    <a:lumOff val="60000"/>
+                  </a:schemeClr>
+                </a:solidFill>
+              </a:rPr>
+              <a:t>VS </a:t>
+            </a:r>
+            <a:r>
+              <a:rPr lang="fr-FR" dirty="0" smtClean="0">
+                <a:solidFill>
+                  <a:schemeClr val="accent1">
+                    <a:lumMod val="40000"/>
+                    <a:lumOff val="60000"/>
+                  </a:schemeClr>
+                </a:solidFill>
+              </a:rPr>
               <a:t>CODE</a:t>
             </a:r>
             <a:r>
@@ -3936,7 +3954,43 @@
               <a:rPr lang="fr-FR" sz="8000" dirty="0">
                 <a:sym typeface="Montserrat Regular"/>
               </a:rPr>
-              <a:t>COMMENT CRÉER UNE UI À PARTIR D'UNE API EN QUELQUES MINUTES</a:t>
+              <a:t>COMMENT CRÉER UNE </a:t>
+            </a:r>
+            <a:r>
+              <a:rPr lang="fr-FR" sz="8000" dirty="0">
+                <a:solidFill>
+                  <a:schemeClr val="accent3">
+                    <a:lumMod val="40000"/>
+                    <a:lumOff val="60000"/>
+                  </a:schemeClr>
+                </a:solidFill>
+                <a:sym typeface="Montserrat Regular"/>
+              </a:rPr>
+              <a:t>UI</a:t>
+            </a:r>
+            <a:r>
+              <a:rPr lang="fr-FR" sz="8000" dirty="0">
+                <a:sym typeface="Montserrat Regular"/>
+              </a:rPr>
+              <a:t> À PARTIR D'UNE </a:t>
+            </a:r>
+            <a:r>
+              <a:rPr lang="fr-FR" sz="8000" dirty="0">
+                <a:solidFill>
+                  <a:schemeClr val="accent5">
+                    <a:lumMod val="40000"/>
+                    <a:lumOff val="60000"/>
+                  </a:schemeClr>
+                </a:solidFill>
+                <a:sym typeface="Montserrat Regular"/>
+              </a:rPr>
+              <a:t>API</a:t>
+            </a:r>
+            <a:r>
+              <a:rPr lang="fr-FR" sz="8000" dirty="0">
+                <a:sym typeface="Montserrat Regular"/>
+              </a:rPr>
+              <a:t> EN QUELQUES MINUTES</a:t>
             </a:r>
             <a:endParaRPr sz="8000" dirty="0"/>
           </a:p>
@@ -4031,6 +4085,13 @@
     <a:masterClrMapping/>
   </p:clrMapOvr>
   <p:transition spd="med"/>
+  <p:timing>
+    <p:tnLst>
+      <p:par>
+        <p:cTn id="1" dur="indefinite" restart="never" nodeType="tmRoot"/>
+      </p:par>
+    </p:tnLst>
+  </p:timing>
 </p:sld>
 </file>
 
@@ -5136,6 +5197,13 @@
     <a:masterClrMapping/>
   </p:clrMapOvr>
   <p:transition spd="med"/>
+  <p:timing>
+    <p:tnLst>
+      <p:par>
+        <p:cTn id="1" dur="indefinite" restart="never" nodeType="tmRoot"/>
+      </p:par>
+    </p:tnLst>
+  </p:timing>
 </p:sld>
 </file>
 
@@ -6668,6 +6736,13 @@
     <a:masterClrMapping/>
   </p:clrMapOvr>
   <p:transition spd="med"/>
+  <p:timing>
+    <p:tnLst>
+      <p:par>
+        <p:cTn id="1" dur="indefinite" restart="never" nodeType="tmRoot"/>
+      </p:par>
+    </p:tnLst>
+  </p:timing>
 </p:sld>
 </file>
 
@@ -6808,6 +6883,13 @@
     <a:masterClrMapping/>
   </p:clrMapOvr>
   <p:transition spd="med"/>
+  <p:timing>
+    <p:tnLst>
+      <p:par>
+        <p:cTn id="1" dur="indefinite" restart="never" nodeType="tmRoot"/>
+      </p:par>
+    </p:tnLst>
+  </p:timing>
 </p:sld>
 </file>
 
@@ -6920,6 +7002,13 @@
     <a:masterClrMapping/>
   </p:clrMapOvr>
   <p:transition spd="med"/>
+  <p:timing>
+    <p:tnLst>
+      <p:par>
+        <p:cTn id="1" dur="indefinite" restart="never" nodeType="tmRoot"/>
+      </p:par>
+    </p:tnLst>
+  </p:timing>
 </p:sld>
 </file>
 

</xml_diff>

<commit_message>
add twitter handle to ppt
</commit_message>
<xml_diff>
--- a/Etendre VS Code - Devoxx 2019.pptx
+++ b/Etendre VS Code - Devoxx 2019.pptx
@@ -4079,6 +4079,113 @@
           </a:prstGeom>
         </p:spPr>
       </p:pic>
+      <p:sp>
+        <p:nvSpPr>
+          <p:cNvPr id="3" name="ZoneTexte 2"/>
+          <p:cNvSpPr txBox="1"/>
+          <p:nvPr/>
+        </p:nvSpPr>
+        <p:spPr>
+          <a:xfrm>
+            <a:off x="2127496" y="13106338"/>
+            <a:ext cx="1317667" cy="452046"/>
+          </a:xfrm>
+          <a:prstGeom prst="rect">
+            <a:avLst/>
+          </a:prstGeom>
+          <a:noFill/>
+          <a:ln w="12700" cap="flat">
+            <a:noFill/>
+            <a:miter lim="400000"/>
+          </a:ln>
+          <a:effectLst/>
+          <a:sp3d/>
+        </p:spPr>
+        <p:style>
+          <a:lnRef idx="0">
+            <a:scrgbClr r="0" g="0" b="0"/>
+          </a:lnRef>
+          <a:fillRef idx="0">
+            <a:scrgbClr r="0" g="0" b="0"/>
+          </a:fillRef>
+          <a:effectRef idx="0">
+            <a:scrgbClr r="0" g="0" b="0"/>
+          </a:effectRef>
+          <a:fontRef idx="none"/>
+        </p:style>
+        <p:txBody>
+          <a:bodyPr rot="0" spcFirstLastPara="1" vertOverflow="overflow" horzOverflow="overflow" vert="horz" wrap="none" lIns="71437" tIns="71437" rIns="71437" bIns="71437" numCol="1" spcCol="38100" rtlCol="0" anchor="ctr">
+            <a:spAutoFit/>
+          </a:bodyPr>
+          <a:lstStyle/>
+          <a:p>
+            <a:pPr marL="0" marR="0" indent="0" algn="ctr" defTabSz="821531" rtl="0" fontAlgn="auto" latinLnBrk="0" hangingPunct="0">
+              <a:lnSpc>
+                <a:spcPct val="100000"/>
+              </a:lnSpc>
+              <a:spcBef>
+                <a:spcPts val="0"/>
+              </a:spcBef>
+              <a:spcAft>
+                <a:spcPts val="0"/>
+              </a:spcAft>
+              <a:buClrTx/>
+              <a:buSzTx/>
+              <a:buFontTx/>
+              <a:buNone/>
+              <a:tabLst/>
+            </a:pPr>
+            <a:r>
+              <a:rPr kumimoji="0" lang="fr-FR" sz="2000" b="0" i="0" u="none" strike="noStrike" cap="none" spc="0" normalizeH="0" baseline="0" dirty="0" smtClean="0">
+                <a:ln>
+                  <a:noFill/>
+                </a:ln>
+                <a:solidFill>
+                  <a:srgbClr val="FFFFFF"/>
+                </a:solidFill>
+                <a:effectLst/>
+                <a:uFillTx/>
+                <a:latin typeface="Helvetica Light"/>
+                <a:ea typeface="Helvetica Light"/>
+                <a:cs typeface="Helvetica Light"/>
+                <a:sym typeface="Helvetica Light"/>
+              </a:rPr>
+              <a:t>@</a:t>
+            </a:r>
+            <a:r>
+              <a:rPr kumimoji="0" lang="fr-FR" sz="2000" b="0" i="0" u="none" strike="noStrike" cap="none" spc="0" normalizeH="0" baseline="0" dirty="0" err="1" smtClean="0">
+                <a:ln>
+                  <a:noFill/>
+                </a:ln>
+                <a:solidFill>
+                  <a:srgbClr val="FFFFFF"/>
+                </a:solidFill>
+                <a:effectLst/>
+                <a:uFillTx/>
+                <a:latin typeface="Helvetica Light"/>
+                <a:ea typeface="Helvetica Light"/>
+                <a:cs typeface="Helvetica Light"/>
+                <a:sym typeface="Helvetica Light"/>
+              </a:rPr>
+              <a:t>joanrieu</a:t>
+            </a:r>
+            <a:endParaRPr kumimoji="0" lang="fr-FR" sz="2000" b="0" i="0" u="none" strike="noStrike" cap="none" spc="0" normalizeH="0" baseline="0" dirty="0">
+              <a:ln>
+                <a:noFill/>
+              </a:ln>
+              <a:solidFill>
+                <a:srgbClr val="FFFFFF"/>
+              </a:solidFill>
+              <a:effectLst/>
+              <a:uFillTx/>
+              <a:latin typeface="Helvetica Light"/>
+              <a:ea typeface="Helvetica Light"/>
+              <a:cs typeface="Helvetica Light"/>
+              <a:sym typeface="Helvetica Light"/>
+            </a:endParaRPr>
+          </a:p>
+        </p:txBody>
+      </p:sp>
     </p:spTree>
   </p:cSld>
   <p:clrMapOvr>
@@ -5170,6 +5277,113 @@
               <a:t>CLI</a:t>
             </a:r>
             <a:endParaRPr kumimoji="0" lang="fr-FR" sz="5000" b="0" i="0" u="none" strike="noStrike" cap="none" spc="0" normalizeH="0" baseline="0" dirty="0">
+              <a:ln>
+                <a:noFill/>
+              </a:ln>
+              <a:solidFill>
+                <a:srgbClr val="FFFFFF"/>
+              </a:solidFill>
+              <a:effectLst/>
+              <a:uFillTx/>
+              <a:latin typeface="Helvetica Light"/>
+              <a:ea typeface="Helvetica Light"/>
+              <a:cs typeface="Helvetica Light"/>
+              <a:sym typeface="Helvetica Light"/>
+            </a:endParaRPr>
+          </a:p>
+        </p:txBody>
+      </p:sp>
+      <p:sp>
+        <p:nvSpPr>
+          <p:cNvPr id="16" name="ZoneTexte 15"/>
+          <p:cNvSpPr txBox="1"/>
+          <p:nvPr/>
+        </p:nvSpPr>
+        <p:spPr>
+          <a:xfrm>
+            <a:off x="2127496" y="13106338"/>
+            <a:ext cx="1317667" cy="452046"/>
+          </a:xfrm>
+          <a:prstGeom prst="rect">
+            <a:avLst/>
+          </a:prstGeom>
+          <a:noFill/>
+          <a:ln w="12700" cap="flat">
+            <a:noFill/>
+            <a:miter lim="400000"/>
+          </a:ln>
+          <a:effectLst/>
+          <a:sp3d/>
+        </p:spPr>
+        <p:style>
+          <a:lnRef idx="0">
+            <a:scrgbClr r="0" g="0" b="0"/>
+          </a:lnRef>
+          <a:fillRef idx="0">
+            <a:scrgbClr r="0" g="0" b="0"/>
+          </a:fillRef>
+          <a:effectRef idx="0">
+            <a:scrgbClr r="0" g="0" b="0"/>
+          </a:effectRef>
+          <a:fontRef idx="none"/>
+        </p:style>
+        <p:txBody>
+          <a:bodyPr rot="0" spcFirstLastPara="1" vertOverflow="overflow" horzOverflow="overflow" vert="horz" wrap="none" lIns="71437" tIns="71437" rIns="71437" bIns="71437" numCol="1" spcCol="38100" rtlCol="0" anchor="ctr">
+            <a:spAutoFit/>
+          </a:bodyPr>
+          <a:lstStyle/>
+          <a:p>
+            <a:pPr marL="0" marR="0" indent="0" algn="ctr" defTabSz="821531" rtl="0" fontAlgn="auto" latinLnBrk="0" hangingPunct="0">
+              <a:lnSpc>
+                <a:spcPct val="100000"/>
+              </a:lnSpc>
+              <a:spcBef>
+                <a:spcPts val="0"/>
+              </a:spcBef>
+              <a:spcAft>
+                <a:spcPts val="0"/>
+              </a:spcAft>
+              <a:buClrTx/>
+              <a:buSzTx/>
+              <a:buFontTx/>
+              <a:buNone/>
+              <a:tabLst/>
+            </a:pPr>
+            <a:r>
+              <a:rPr kumimoji="0" lang="fr-FR" sz="2000" b="0" i="0" u="none" strike="noStrike" cap="none" spc="0" normalizeH="0" baseline="0" dirty="0" smtClean="0">
+                <a:ln>
+                  <a:noFill/>
+                </a:ln>
+                <a:solidFill>
+                  <a:srgbClr val="FFFFFF"/>
+                </a:solidFill>
+                <a:effectLst/>
+                <a:uFillTx/>
+                <a:latin typeface="Helvetica Light"/>
+                <a:ea typeface="Helvetica Light"/>
+                <a:cs typeface="Helvetica Light"/>
+                <a:sym typeface="Helvetica Light"/>
+              </a:rPr>
+              <a:t>@</a:t>
+            </a:r>
+            <a:r>
+              <a:rPr kumimoji="0" lang="fr-FR" sz="2000" b="0" i="0" u="none" strike="noStrike" cap="none" spc="0" normalizeH="0" baseline="0" dirty="0" err="1" smtClean="0">
+                <a:ln>
+                  <a:noFill/>
+                </a:ln>
+                <a:solidFill>
+                  <a:srgbClr val="FFFFFF"/>
+                </a:solidFill>
+                <a:effectLst/>
+                <a:uFillTx/>
+                <a:latin typeface="Helvetica Light"/>
+                <a:ea typeface="Helvetica Light"/>
+                <a:cs typeface="Helvetica Light"/>
+                <a:sym typeface="Helvetica Light"/>
+              </a:rPr>
+              <a:t>joanrieu</a:t>
+            </a:r>
+            <a:endParaRPr kumimoji="0" lang="fr-FR" sz="2000" b="0" i="0" u="none" strike="noStrike" cap="none" spc="0" normalizeH="0" baseline="0" dirty="0">
               <a:ln>
                 <a:noFill/>
               </a:ln>
@@ -6627,6 +6841,113 @@
           </a:p>
         </p:txBody>
       </p:sp>
+      <p:sp>
+        <p:nvSpPr>
+          <p:cNvPr id="28" name="ZoneTexte 27"/>
+          <p:cNvSpPr txBox="1"/>
+          <p:nvPr/>
+        </p:nvSpPr>
+        <p:spPr>
+          <a:xfrm>
+            <a:off x="2127496" y="13106338"/>
+            <a:ext cx="1317667" cy="452046"/>
+          </a:xfrm>
+          <a:prstGeom prst="rect">
+            <a:avLst/>
+          </a:prstGeom>
+          <a:noFill/>
+          <a:ln w="12700" cap="flat">
+            <a:noFill/>
+            <a:miter lim="400000"/>
+          </a:ln>
+          <a:effectLst/>
+          <a:sp3d/>
+        </p:spPr>
+        <p:style>
+          <a:lnRef idx="0">
+            <a:scrgbClr r="0" g="0" b="0"/>
+          </a:lnRef>
+          <a:fillRef idx="0">
+            <a:scrgbClr r="0" g="0" b="0"/>
+          </a:fillRef>
+          <a:effectRef idx="0">
+            <a:scrgbClr r="0" g="0" b="0"/>
+          </a:effectRef>
+          <a:fontRef idx="none"/>
+        </p:style>
+        <p:txBody>
+          <a:bodyPr rot="0" spcFirstLastPara="1" vertOverflow="overflow" horzOverflow="overflow" vert="horz" wrap="none" lIns="71437" tIns="71437" rIns="71437" bIns="71437" numCol="1" spcCol="38100" rtlCol="0" anchor="ctr">
+            <a:spAutoFit/>
+          </a:bodyPr>
+          <a:lstStyle/>
+          <a:p>
+            <a:pPr marL="0" marR="0" indent="0" algn="ctr" defTabSz="821531" rtl="0" fontAlgn="auto" latinLnBrk="0" hangingPunct="0">
+              <a:lnSpc>
+                <a:spcPct val="100000"/>
+              </a:lnSpc>
+              <a:spcBef>
+                <a:spcPts val="0"/>
+              </a:spcBef>
+              <a:spcAft>
+                <a:spcPts val="0"/>
+              </a:spcAft>
+              <a:buClrTx/>
+              <a:buSzTx/>
+              <a:buFontTx/>
+              <a:buNone/>
+              <a:tabLst/>
+            </a:pPr>
+            <a:r>
+              <a:rPr kumimoji="0" lang="fr-FR" sz="2000" b="0" i="0" u="none" strike="noStrike" cap="none" spc="0" normalizeH="0" baseline="0" dirty="0" smtClean="0">
+                <a:ln>
+                  <a:noFill/>
+                </a:ln>
+                <a:solidFill>
+                  <a:srgbClr val="FFFFFF"/>
+                </a:solidFill>
+                <a:effectLst/>
+                <a:uFillTx/>
+                <a:latin typeface="Helvetica Light"/>
+                <a:ea typeface="Helvetica Light"/>
+                <a:cs typeface="Helvetica Light"/>
+                <a:sym typeface="Helvetica Light"/>
+              </a:rPr>
+              <a:t>@</a:t>
+            </a:r>
+            <a:r>
+              <a:rPr kumimoji="0" lang="fr-FR" sz="2000" b="0" i="0" u="none" strike="noStrike" cap="none" spc="0" normalizeH="0" baseline="0" dirty="0" err="1" smtClean="0">
+                <a:ln>
+                  <a:noFill/>
+                </a:ln>
+                <a:solidFill>
+                  <a:srgbClr val="FFFFFF"/>
+                </a:solidFill>
+                <a:effectLst/>
+                <a:uFillTx/>
+                <a:latin typeface="Helvetica Light"/>
+                <a:ea typeface="Helvetica Light"/>
+                <a:cs typeface="Helvetica Light"/>
+                <a:sym typeface="Helvetica Light"/>
+              </a:rPr>
+              <a:t>joanrieu</a:t>
+            </a:r>
+            <a:endParaRPr kumimoji="0" lang="fr-FR" sz="2000" b="0" i="0" u="none" strike="noStrike" cap="none" spc="0" normalizeH="0" baseline="0" dirty="0">
+              <a:ln>
+                <a:noFill/>
+              </a:ln>
+              <a:solidFill>
+                <a:srgbClr val="FFFFFF"/>
+              </a:solidFill>
+              <a:effectLst/>
+              <a:uFillTx/>
+              <a:latin typeface="Helvetica Light"/>
+              <a:ea typeface="Helvetica Light"/>
+              <a:cs typeface="Helvetica Light"/>
+              <a:sym typeface="Helvetica Light"/>
+            </a:endParaRPr>
+          </a:p>
+        </p:txBody>
+      </p:sp>
     </p:spTree>
     <p:extLst>
       <p:ext uri="{BB962C8B-B14F-4D97-AF65-F5344CB8AC3E}">
@@ -6730,6 +7051,113 @@
           </a:prstGeom>
         </p:spPr>
       </p:pic>
+      <p:sp>
+        <p:nvSpPr>
+          <p:cNvPr id="5" name="ZoneTexte 4"/>
+          <p:cNvSpPr txBox="1"/>
+          <p:nvPr/>
+        </p:nvSpPr>
+        <p:spPr>
+          <a:xfrm>
+            <a:off x="2127496" y="13106338"/>
+            <a:ext cx="1317667" cy="452046"/>
+          </a:xfrm>
+          <a:prstGeom prst="rect">
+            <a:avLst/>
+          </a:prstGeom>
+          <a:noFill/>
+          <a:ln w="12700" cap="flat">
+            <a:noFill/>
+            <a:miter lim="400000"/>
+          </a:ln>
+          <a:effectLst/>
+          <a:sp3d/>
+        </p:spPr>
+        <p:style>
+          <a:lnRef idx="0">
+            <a:scrgbClr r="0" g="0" b="0"/>
+          </a:lnRef>
+          <a:fillRef idx="0">
+            <a:scrgbClr r="0" g="0" b="0"/>
+          </a:fillRef>
+          <a:effectRef idx="0">
+            <a:scrgbClr r="0" g="0" b="0"/>
+          </a:effectRef>
+          <a:fontRef idx="none"/>
+        </p:style>
+        <p:txBody>
+          <a:bodyPr rot="0" spcFirstLastPara="1" vertOverflow="overflow" horzOverflow="overflow" vert="horz" wrap="none" lIns="71437" tIns="71437" rIns="71437" bIns="71437" numCol="1" spcCol="38100" rtlCol="0" anchor="ctr">
+            <a:spAutoFit/>
+          </a:bodyPr>
+          <a:lstStyle/>
+          <a:p>
+            <a:pPr marL="0" marR="0" indent="0" algn="ctr" defTabSz="821531" rtl="0" fontAlgn="auto" latinLnBrk="0" hangingPunct="0">
+              <a:lnSpc>
+                <a:spcPct val="100000"/>
+              </a:lnSpc>
+              <a:spcBef>
+                <a:spcPts val="0"/>
+              </a:spcBef>
+              <a:spcAft>
+                <a:spcPts val="0"/>
+              </a:spcAft>
+              <a:buClrTx/>
+              <a:buSzTx/>
+              <a:buFontTx/>
+              <a:buNone/>
+              <a:tabLst/>
+            </a:pPr>
+            <a:r>
+              <a:rPr kumimoji="0" lang="fr-FR" sz="2000" b="0" i="0" u="none" strike="noStrike" cap="none" spc="0" normalizeH="0" baseline="0" dirty="0" smtClean="0">
+                <a:ln>
+                  <a:noFill/>
+                </a:ln>
+                <a:solidFill>
+                  <a:srgbClr val="FFFFFF"/>
+                </a:solidFill>
+                <a:effectLst/>
+                <a:uFillTx/>
+                <a:latin typeface="Helvetica Light"/>
+                <a:ea typeface="Helvetica Light"/>
+                <a:cs typeface="Helvetica Light"/>
+                <a:sym typeface="Helvetica Light"/>
+              </a:rPr>
+              <a:t>@</a:t>
+            </a:r>
+            <a:r>
+              <a:rPr kumimoji="0" lang="fr-FR" sz="2000" b="0" i="0" u="none" strike="noStrike" cap="none" spc="0" normalizeH="0" baseline="0" dirty="0" err="1" smtClean="0">
+                <a:ln>
+                  <a:noFill/>
+                </a:ln>
+                <a:solidFill>
+                  <a:srgbClr val="FFFFFF"/>
+                </a:solidFill>
+                <a:effectLst/>
+                <a:uFillTx/>
+                <a:latin typeface="Helvetica Light"/>
+                <a:ea typeface="Helvetica Light"/>
+                <a:cs typeface="Helvetica Light"/>
+                <a:sym typeface="Helvetica Light"/>
+              </a:rPr>
+              <a:t>joanrieu</a:t>
+            </a:r>
+            <a:endParaRPr kumimoji="0" lang="fr-FR" sz="2000" b="0" i="0" u="none" strike="noStrike" cap="none" spc="0" normalizeH="0" baseline="0" dirty="0">
+              <a:ln>
+                <a:noFill/>
+              </a:ln>
+              <a:solidFill>
+                <a:srgbClr val="FFFFFF"/>
+              </a:solidFill>
+              <a:effectLst/>
+              <a:uFillTx/>
+              <a:latin typeface="Helvetica Light"/>
+              <a:ea typeface="Helvetica Light"/>
+              <a:cs typeface="Helvetica Light"/>
+              <a:sym typeface="Helvetica Light"/>
+            </a:endParaRPr>
+          </a:p>
+        </p:txBody>
+      </p:sp>
     </p:spTree>
   </p:cSld>
   <p:clrMapOvr>
@@ -6872,6 +7300,113 @@
           </a:prstGeom>
         </p:spPr>
       </p:pic>
+      <p:sp>
+        <p:nvSpPr>
+          <p:cNvPr id="10" name="ZoneTexte 9"/>
+          <p:cNvSpPr txBox="1"/>
+          <p:nvPr/>
+        </p:nvSpPr>
+        <p:spPr>
+          <a:xfrm>
+            <a:off x="2127496" y="13106338"/>
+            <a:ext cx="1317667" cy="452046"/>
+          </a:xfrm>
+          <a:prstGeom prst="rect">
+            <a:avLst/>
+          </a:prstGeom>
+          <a:noFill/>
+          <a:ln w="12700" cap="flat">
+            <a:noFill/>
+            <a:miter lim="400000"/>
+          </a:ln>
+          <a:effectLst/>
+          <a:sp3d/>
+        </p:spPr>
+        <p:style>
+          <a:lnRef idx="0">
+            <a:scrgbClr r="0" g="0" b="0"/>
+          </a:lnRef>
+          <a:fillRef idx="0">
+            <a:scrgbClr r="0" g="0" b="0"/>
+          </a:fillRef>
+          <a:effectRef idx="0">
+            <a:scrgbClr r="0" g="0" b="0"/>
+          </a:effectRef>
+          <a:fontRef idx="none"/>
+        </p:style>
+        <p:txBody>
+          <a:bodyPr rot="0" spcFirstLastPara="1" vertOverflow="overflow" horzOverflow="overflow" vert="horz" wrap="none" lIns="71437" tIns="71437" rIns="71437" bIns="71437" numCol="1" spcCol="38100" rtlCol="0" anchor="ctr">
+            <a:spAutoFit/>
+          </a:bodyPr>
+          <a:lstStyle/>
+          <a:p>
+            <a:pPr marL="0" marR="0" indent="0" algn="ctr" defTabSz="821531" rtl="0" fontAlgn="auto" latinLnBrk="0" hangingPunct="0">
+              <a:lnSpc>
+                <a:spcPct val="100000"/>
+              </a:lnSpc>
+              <a:spcBef>
+                <a:spcPts val="0"/>
+              </a:spcBef>
+              <a:spcAft>
+                <a:spcPts val="0"/>
+              </a:spcAft>
+              <a:buClrTx/>
+              <a:buSzTx/>
+              <a:buFontTx/>
+              <a:buNone/>
+              <a:tabLst/>
+            </a:pPr>
+            <a:r>
+              <a:rPr kumimoji="0" lang="fr-FR" sz="2000" b="0" i="0" u="none" strike="noStrike" cap="none" spc="0" normalizeH="0" baseline="0" dirty="0" smtClean="0">
+                <a:ln>
+                  <a:noFill/>
+                </a:ln>
+                <a:solidFill>
+                  <a:srgbClr val="FFFFFF"/>
+                </a:solidFill>
+                <a:effectLst/>
+                <a:uFillTx/>
+                <a:latin typeface="Helvetica Light"/>
+                <a:ea typeface="Helvetica Light"/>
+                <a:cs typeface="Helvetica Light"/>
+                <a:sym typeface="Helvetica Light"/>
+              </a:rPr>
+              <a:t>@</a:t>
+            </a:r>
+            <a:r>
+              <a:rPr kumimoji="0" lang="fr-FR" sz="2000" b="0" i="0" u="none" strike="noStrike" cap="none" spc="0" normalizeH="0" baseline="0" dirty="0" err="1" smtClean="0">
+                <a:ln>
+                  <a:noFill/>
+                </a:ln>
+                <a:solidFill>
+                  <a:srgbClr val="FFFFFF"/>
+                </a:solidFill>
+                <a:effectLst/>
+                <a:uFillTx/>
+                <a:latin typeface="Helvetica Light"/>
+                <a:ea typeface="Helvetica Light"/>
+                <a:cs typeface="Helvetica Light"/>
+                <a:sym typeface="Helvetica Light"/>
+              </a:rPr>
+              <a:t>joanrieu</a:t>
+            </a:r>
+            <a:endParaRPr kumimoji="0" lang="fr-FR" sz="2000" b="0" i="0" u="none" strike="noStrike" cap="none" spc="0" normalizeH="0" baseline="0" dirty="0">
+              <a:ln>
+                <a:noFill/>
+              </a:ln>
+              <a:solidFill>
+                <a:srgbClr val="FFFFFF"/>
+              </a:solidFill>
+              <a:effectLst/>
+              <a:uFillTx/>
+              <a:latin typeface="Helvetica Light"/>
+              <a:ea typeface="Helvetica Light"/>
+              <a:cs typeface="Helvetica Light"/>
+              <a:sym typeface="Helvetica Light"/>
+            </a:endParaRPr>
+          </a:p>
+        </p:txBody>
+      </p:sp>
     </p:spTree>
     <p:extLst>
       <p:ext uri="{BB962C8B-B14F-4D97-AF65-F5344CB8AC3E}">
@@ -6996,6 +7531,113 @@
           </a:prstGeom>
         </p:spPr>
       </p:pic>
+      <p:sp>
+        <p:nvSpPr>
+          <p:cNvPr id="6" name="ZoneTexte 5"/>
+          <p:cNvSpPr txBox="1"/>
+          <p:nvPr/>
+        </p:nvSpPr>
+        <p:spPr>
+          <a:xfrm>
+            <a:off x="2127496" y="13106338"/>
+            <a:ext cx="1317667" cy="452046"/>
+          </a:xfrm>
+          <a:prstGeom prst="rect">
+            <a:avLst/>
+          </a:prstGeom>
+          <a:noFill/>
+          <a:ln w="12700" cap="flat">
+            <a:noFill/>
+            <a:miter lim="400000"/>
+          </a:ln>
+          <a:effectLst/>
+          <a:sp3d/>
+        </p:spPr>
+        <p:style>
+          <a:lnRef idx="0">
+            <a:scrgbClr r="0" g="0" b="0"/>
+          </a:lnRef>
+          <a:fillRef idx="0">
+            <a:scrgbClr r="0" g="0" b="0"/>
+          </a:fillRef>
+          <a:effectRef idx="0">
+            <a:scrgbClr r="0" g="0" b="0"/>
+          </a:effectRef>
+          <a:fontRef idx="none"/>
+        </p:style>
+        <p:txBody>
+          <a:bodyPr rot="0" spcFirstLastPara="1" vertOverflow="overflow" horzOverflow="overflow" vert="horz" wrap="none" lIns="71437" tIns="71437" rIns="71437" bIns="71437" numCol="1" spcCol="38100" rtlCol="0" anchor="ctr">
+            <a:spAutoFit/>
+          </a:bodyPr>
+          <a:lstStyle/>
+          <a:p>
+            <a:pPr marL="0" marR="0" indent="0" algn="ctr" defTabSz="821531" rtl="0" fontAlgn="auto" latinLnBrk="0" hangingPunct="0">
+              <a:lnSpc>
+                <a:spcPct val="100000"/>
+              </a:lnSpc>
+              <a:spcBef>
+                <a:spcPts val="0"/>
+              </a:spcBef>
+              <a:spcAft>
+                <a:spcPts val="0"/>
+              </a:spcAft>
+              <a:buClrTx/>
+              <a:buSzTx/>
+              <a:buFontTx/>
+              <a:buNone/>
+              <a:tabLst/>
+            </a:pPr>
+            <a:r>
+              <a:rPr kumimoji="0" lang="fr-FR" sz="2000" b="0" i="0" u="none" strike="noStrike" cap="none" spc="0" normalizeH="0" baseline="0" dirty="0" smtClean="0">
+                <a:ln>
+                  <a:noFill/>
+                </a:ln>
+                <a:solidFill>
+                  <a:srgbClr val="FFFFFF"/>
+                </a:solidFill>
+                <a:effectLst/>
+                <a:uFillTx/>
+                <a:latin typeface="Helvetica Light"/>
+                <a:ea typeface="Helvetica Light"/>
+                <a:cs typeface="Helvetica Light"/>
+                <a:sym typeface="Helvetica Light"/>
+              </a:rPr>
+              <a:t>@</a:t>
+            </a:r>
+            <a:r>
+              <a:rPr kumimoji="0" lang="fr-FR" sz="2000" b="0" i="0" u="none" strike="noStrike" cap="none" spc="0" normalizeH="0" baseline="0" dirty="0" err="1" smtClean="0">
+                <a:ln>
+                  <a:noFill/>
+                </a:ln>
+                <a:solidFill>
+                  <a:srgbClr val="FFFFFF"/>
+                </a:solidFill>
+                <a:effectLst/>
+                <a:uFillTx/>
+                <a:latin typeface="Helvetica Light"/>
+                <a:ea typeface="Helvetica Light"/>
+                <a:cs typeface="Helvetica Light"/>
+                <a:sym typeface="Helvetica Light"/>
+              </a:rPr>
+              <a:t>joanrieu</a:t>
+            </a:r>
+            <a:endParaRPr kumimoji="0" lang="fr-FR" sz="2000" b="0" i="0" u="none" strike="noStrike" cap="none" spc="0" normalizeH="0" baseline="0" dirty="0">
+              <a:ln>
+                <a:noFill/>
+              </a:ln>
+              <a:solidFill>
+                <a:srgbClr val="FFFFFF"/>
+              </a:solidFill>
+              <a:effectLst/>
+              <a:uFillTx/>
+              <a:latin typeface="Helvetica Light"/>
+              <a:ea typeface="Helvetica Light"/>
+              <a:cs typeface="Helvetica Light"/>
+              <a:sym typeface="Helvetica Light"/>
+            </a:endParaRPr>
+          </a:p>
+        </p:txBody>
+      </p:sp>
     </p:spTree>
   </p:cSld>
   <p:clrMapOvr>

</xml_diff>